<commit_message>
ppt which was not presented but emailed.
</commit_message>
<xml_diff>
--- a/research_showcase/researchSummary_aryan_ritwajeet_jha.pptx
+++ b/research_showcase/researchSummary_aryan_ritwajeet_jha.pptx
@@ -5,22 +5,23 @@
     <p:sldMasterId id="2147483686" r:id="rId1"/>
   </p:sldMasterIdLst>
   <p:notesMasterIdLst>
-    <p:notesMasterId r:id="rId12"/>
+    <p:notesMasterId r:id="rId13"/>
   </p:notesMasterIdLst>
   <p:handoutMasterIdLst>
-    <p:handoutMasterId r:id="rId13"/>
+    <p:handoutMasterId r:id="rId14"/>
   </p:handoutMasterIdLst>
   <p:sldIdLst>
     <p:sldId id="257" r:id="rId2"/>
     <p:sldId id="276" r:id="rId3"/>
     <p:sldId id="278" r:id="rId4"/>
-    <p:sldId id="264" r:id="rId5"/>
-    <p:sldId id="271" r:id="rId6"/>
-    <p:sldId id="277" r:id="rId7"/>
-    <p:sldId id="266" r:id="rId8"/>
-    <p:sldId id="267" r:id="rId9"/>
-    <p:sldId id="269" r:id="rId10"/>
-    <p:sldId id="270" r:id="rId11"/>
+    <p:sldId id="279" r:id="rId5"/>
+    <p:sldId id="280" r:id="rId6"/>
+    <p:sldId id="264" r:id="rId7"/>
+    <p:sldId id="271" r:id="rId8"/>
+    <p:sldId id="281" r:id="rId9"/>
+    <p:sldId id="282" r:id="rId10"/>
+    <p:sldId id="277" r:id="rId11"/>
+    <p:sldId id="266" r:id="rId12"/>
   </p:sldIdLst>
   <p:sldSz cx="12192000" cy="6858000"/>
   <p:notesSz cx="6858000" cy="9144000"/>
@@ -122,22 +123,23 @@
   <p:extLst>
     <p:ext uri="{521415D9-36F7-43E2-AB2F-B90AF26B5E84}">
       <p14:sectionLst xmlns:p14="http://schemas.microsoft.com/office/powerpoint/2010/main">
-        <p14:section name="Default Section" id="{E4B3FFD1-4036-4DEB-BDF5-EFFEB8818019}">
+        <p14:section name="Title Page" id="{E4B3FFD1-4036-4DEB-BDF5-EFFEB8818019}">
           <p14:sldIdLst>
             <p14:sldId id="257"/>
           </p14:sldIdLst>
         </p14:section>
-        <p14:section name="Untitled Section" id="{11335DDB-EB99-45A2-9CA8-659375EE3140}">
+        <p14:section name="Body" id="{11335DDB-EB99-45A2-9CA8-659375EE3140}">
           <p14:sldIdLst>
             <p14:sldId id="276"/>
             <p14:sldId id="278"/>
+            <p14:sldId id="279"/>
+            <p14:sldId id="280"/>
             <p14:sldId id="264"/>
             <p14:sldId id="271"/>
+            <p14:sldId id="281"/>
+            <p14:sldId id="282"/>
             <p14:sldId id="277"/>
             <p14:sldId id="266"/>
-            <p14:sldId id="267"/>
-            <p14:sldId id="269"/>
-            <p14:sldId id="270"/>
           </p14:sldIdLst>
         </p14:section>
       </p14:sectionLst>
@@ -257,7 +259,7 @@
           <a:p>
             <a:fld id="{D542D976-EE9F-4D81-93B4-309048736BC3}" type="datetimeFigureOut">
               <a:rPr lang="en-US" smtClean="0"/>
-              <a:t>3/14/2023</a:t>
+              <a:t>3/15/2023</a:t>
             </a:fld>
             <a:endParaRPr lang="en-US"/>
           </a:p>
@@ -434,7 +436,7 @@
           <a:p>
             <a:fld id="{10CB9D09-B8C5-4B94-B5DC-AF4ED464E025}" type="datetimeFigureOut">
               <a:rPr lang="en-US" smtClean="0"/>
-              <a:t>3/14/2023</a:t>
+              <a:t>3/15/2023</a:t>
             </a:fld>
             <a:endParaRPr lang="en-US"/>
           </a:p>
@@ -699,191 +701,6 @@
     </a:lvl9pPr>
   </p:notesStyle>
 </p:notesMaster>
-</file>
-
-<file path=ppt/notesSlides/notesSlide1.xml><?xml version="1.0" encoding="utf-8"?>
-<p:notes xmlns:a="http://schemas.openxmlformats.org/drawingml/2006/main" xmlns:r="http://schemas.openxmlformats.org/officeDocument/2006/relationships" xmlns:p="http://schemas.openxmlformats.org/presentationml/2006/main">
-  <p:cSld>
-    <p:spTree>
-      <p:nvGrpSpPr>
-        <p:cNvPr id="1" name=""/>
-        <p:cNvGrpSpPr/>
-        <p:nvPr/>
-      </p:nvGrpSpPr>
-      <p:grpSpPr>
-        <a:xfrm>
-          <a:off x="0" y="0"/>
-          <a:ext cx="0" cy="0"/>
-          <a:chOff x="0" y="0"/>
-          <a:chExt cx="0" cy="0"/>
-        </a:xfrm>
-      </p:grpSpPr>
-      <p:sp>
-        <p:nvSpPr>
-          <p:cNvPr id="2" name="Slide Image Placeholder 1"/>
-          <p:cNvSpPr>
-            <a:spLocks noGrp="1" noRot="1" noChangeAspect="1"/>
-          </p:cNvSpPr>
-          <p:nvPr>
-            <p:ph type="sldImg"/>
-          </p:nvPr>
-        </p:nvSpPr>
-        <p:spPr/>
-      </p:sp>
-      <p:sp>
-        <p:nvSpPr>
-          <p:cNvPr id="3" name="Notes Placeholder 2"/>
-          <p:cNvSpPr>
-            <a:spLocks noGrp="1"/>
-          </p:cNvSpPr>
-          <p:nvPr>
-            <p:ph type="body" idx="1"/>
-          </p:nvPr>
-        </p:nvSpPr>
-        <p:spPr/>
-        <p:txBody>
-          <a:bodyPr/>
-          <a:lstStyle/>
-          <a:p>
-            <a:pPr marL="0" indent="0">
-              <a:buFont typeface="+mj-lt"/>
-              <a:buNone/>
-            </a:pPr>
-            <a:r>
-              <a:rPr lang="en-US" dirty="0"/>
-              <a:t>To get the text box on the right to fit the text: </a:t>
-            </a:r>
-          </a:p>
-          <a:p>
-            <a:pPr marL="228600" indent="-228600">
-              <a:buFont typeface="+mj-lt"/>
-              <a:buAutoNum type="arabicPeriod"/>
-            </a:pPr>
-            <a:r>
-              <a:rPr lang="en-US" b="0" dirty="0"/>
-              <a:t> </a:t>
-            </a:r>
-            <a:r>
-              <a:rPr lang="en-US" b="1" dirty="0"/>
-              <a:t>right click on the text box</a:t>
-            </a:r>
-            <a:r>
-              <a:rPr lang="en-US" dirty="0"/>
-              <a:t>, </a:t>
-            </a:r>
-          </a:p>
-          <a:p>
-            <a:pPr marL="228600" indent="-228600">
-              <a:buFont typeface="+mj-lt"/>
-              <a:buAutoNum type="arabicPeriod"/>
-            </a:pPr>
-            <a:r>
-              <a:rPr lang="en-US" dirty="0"/>
-              <a:t>choose </a:t>
-            </a:r>
-            <a:r>
-              <a:rPr lang="en-US" b="1" dirty="0"/>
-              <a:t>Format Text Effects</a:t>
-            </a:r>
-            <a:r>
-              <a:rPr lang="en-US" dirty="0"/>
-              <a:t>, </a:t>
-            </a:r>
-          </a:p>
-          <a:p>
-            <a:pPr marL="228600" indent="-228600">
-              <a:buFont typeface="+mj-lt"/>
-              <a:buAutoNum type="arabicPeriod"/>
-            </a:pPr>
-            <a:r>
-              <a:rPr lang="en-US" b="0" dirty="0"/>
-              <a:t> </a:t>
-            </a:r>
-            <a:r>
-              <a:rPr lang="en-US" b="1" dirty="0"/>
-              <a:t>click the right symbol </a:t>
-            </a:r>
-            <a:r>
-              <a:rPr lang="en-US" b="1" dirty="0" err="1"/>
-              <a:t>TextBox</a:t>
-            </a:r>
-            <a:r>
-              <a:rPr lang="en-US" dirty="0"/>
-              <a:t>, </a:t>
-            </a:r>
-          </a:p>
-          <a:p>
-            <a:pPr marL="228600" indent="-228600">
-              <a:buFont typeface="+mj-lt"/>
-              <a:buAutoNum type="arabicPeriod"/>
-            </a:pPr>
-            <a:r>
-              <a:rPr lang="en-US" dirty="0"/>
-              <a:t>click </a:t>
-            </a:r>
-            <a:r>
-              <a:rPr lang="en-US" b="1" dirty="0"/>
-              <a:t>Do Not Auto Fit</a:t>
-            </a:r>
-            <a:r>
-              <a:rPr lang="en-US" dirty="0"/>
-              <a:t>, </a:t>
-            </a:r>
-          </a:p>
-          <a:p>
-            <a:pPr marL="228600" indent="-228600">
-              <a:buFont typeface="+mj-lt"/>
-              <a:buAutoNum type="arabicPeriod"/>
-            </a:pPr>
-            <a:r>
-              <a:rPr lang="en-US" dirty="0"/>
-              <a:t>then click </a:t>
-            </a:r>
-            <a:r>
-              <a:rPr lang="en-US" b="1" dirty="0"/>
-              <a:t>Resize Shape to Fit Text</a:t>
-            </a:r>
-            <a:r>
-              <a:rPr lang="en-US" dirty="0"/>
-              <a:t>, the box should conform to fit the text.</a:t>
-            </a:r>
-          </a:p>
-        </p:txBody>
-      </p:sp>
-      <p:sp>
-        <p:nvSpPr>
-          <p:cNvPr id="4" name="Slide Number Placeholder 3"/>
-          <p:cNvSpPr>
-            <a:spLocks noGrp="1"/>
-          </p:cNvSpPr>
-          <p:nvPr>
-            <p:ph type="sldNum" sz="quarter" idx="5"/>
-          </p:nvPr>
-        </p:nvSpPr>
-        <p:spPr/>
-        <p:txBody>
-          <a:bodyPr/>
-          <a:lstStyle/>
-          <a:p>
-            <a:fld id="{85CEC689-B63F-4B6D-AF6D-31DA368AC821}" type="slidenum">
-              <a:rPr lang="en-US" smtClean="0"/>
-              <a:t>10</a:t>
-            </a:fld>
-            <a:endParaRPr lang="en-US"/>
-          </a:p>
-        </p:txBody>
-      </p:sp>
-    </p:spTree>
-    <p:extLst>
-      <p:ext uri="{BB962C8B-B14F-4D97-AF65-F5344CB8AC3E}">
-        <p14:creationId xmlns:p14="http://schemas.microsoft.com/office/powerpoint/2010/main" val="3414291036"/>
-      </p:ext>
-    </p:extLst>
-  </p:cSld>
-  <p:clrMapOvr>
-    <a:masterClrMapping/>
-  </p:clrMapOvr>
-</p:notes>
 </file>
 
 <file path=ppt/slideLayouts/slideLayout1.xml><?xml version="1.0" encoding="utf-8"?>
@@ -4589,10 +4406,10 @@
       </p:grpSpPr>
       <p:sp>
         <p:nvSpPr>
-          <p:cNvPr id="3" name="Title 2">
-            <a:extLst>
-              <a:ext uri="{FF2B5EF4-FFF2-40B4-BE49-F238E27FC236}">
-                <a16:creationId xmlns:a16="http://schemas.microsoft.com/office/drawing/2014/main" id="{3CBE6577-E72F-4D95-91CF-D5BE94921AED}"/>
+          <p:cNvPr id="2" name="Text Placeholder 1">
+            <a:extLst>
+              <a:ext uri="{FF2B5EF4-FFF2-40B4-BE49-F238E27FC236}">
+                <a16:creationId xmlns:a16="http://schemas.microsoft.com/office/drawing/2014/main" id="{09DF75FC-4792-41CB-958E-7EED40C8FDA9}"/>
               </a:ext>
             </a:extLst>
           </p:cNvPr>
@@ -4600,40 +4417,29 @@
             <a:spLocks noGrp="1"/>
           </p:cNvSpPr>
           <p:nvPr>
-            <p:ph type="title"/>
-          </p:nvPr>
-        </p:nvSpPr>
-        <p:spPr>
-          <a:xfrm>
-            <a:off x="1504950" y="626082"/>
-            <a:ext cx="5400817" cy="1828193"/>
+            <p:ph type="body" idx="1"/>
+          </p:nvPr>
+        </p:nvSpPr>
+        <p:spPr>
+          <a:xfrm>
+            <a:off x="1781175" y="1923911"/>
+            <a:ext cx="4537075" cy="806904"/>
           </a:xfrm>
         </p:spPr>
         <p:txBody>
           <a:bodyPr/>
           <a:lstStyle/>
           <a:p>
-            <a:r>
-              <a:rPr lang="en-US"/>
-              <a:t>TATTOOED SCENE STER A TUMERIC</a:t>
-            </a:r>
-            <a:br>
-              <a:rPr lang="en-US"/>
-            </a:br>
-            <a:r>
-              <a:rPr lang="en-US"/>
-              <a:t>CRONUT</a:t>
-            </a:r>
             <a:endParaRPr lang="en-US" dirty="0"/>
           </a:p>
         </p:txBody>
       </p:sp>
       <p:sp>
         <p:nvSpPr>
-          <p:cNvPr id="4" name="Text Placeholder 3">
-            <a:extLst>
-              <a:ext uri="{FF2B5EF4-FFF2-40B4-BE49-F238E27FC236}">
-                <a16:creationId xmlns:a16="http://schemas.microsoft.com/office/drawing/2014/main" id="{7721AD91-1D4A-408D-8089-161600AECD90}"/>
+          <p:cNvPr id="5" name="Content Placeholder 4">
+            <a:extLst>
+              <a:ext uri="{FF2B5EF4-FFF2-40B4-BE49-F238E27FC236}">
+                <a16:creationId xmlns:a16="http://schemas.microsoft.com/office/drawing/2014/main" id="{CAF4E33B-142F-4A0B-86CF-9E36E699BF1B}"/>
               </a:ext>
             </a:extLst>
           </p:cNvPr>
@@ -4641,30 +4447,292 @@
             <a:spLocks noGrp="1"/>
           </p:cNvSpPr>
           <p:nvPr>
-            <p:ph type="body" sz="quarter" idx="13"/>
-          </p:nvPr>
-        </p:nvSpPr>
-        <p:spPr>
-          <a:xfrm>
-            <a:off x="7014575" y="688932"/>
-            <a:ext cx="4572000" cy="3688189"/>
-          </a:xfrm>
-        </p:spPr>
-        <p:txBody>
-          <a:bodyPr bIns="182880">
+            <p:ph sz="half" idx="2"/>
+          </p:nvPr>
+        </p:nvSpPr>
+        <p:spPr>
+          <a:xfrm>
+            <a:off x="1781175" y="2944164"/>
+            <a:ext cx="4537075" cy="3649357"/>
+          </a:xfrm>
+        </p:spPr>
+        <p:txBody>
+          <a:bodyPr/>
+          <a:lstStyle/>
+          <a:p>
+            <a:r>
+              <a:rPr lang="en-US" dirty="0"/>
+              <a:t>Optimal line losses match for all sets of areas.</a:t>
+            </a:r>
+          </a:p>
+        </p:txBody>
+      </p:sp>
+      <p:sp>
+        <p:nvSpPr>
+          <p:cNvPr id="6" name="Content Placeholder 5">
+            <a:extLst>
+              <a:ext uri="{FF2B5EF4-FFF2-40B4-BE49-F238E27FC236}">
+                <a16:creationId xmlns:a16="http://schemas.microsoft.com/office/drawing/2014/main" id="{8795B178-DDDF-494B-AC60-2D8C9442C519}"/>
+              </a:ext>
+            </a:extLst>
+          </p:cNvPr>
+          <p:cNvSpPr>
+            <a:spLocks noGrp="1"/>
+          </p:cNvSpPr>
+          <p:nvPr>
+            <p:ph sz="quarter" idx="4"/>
+          </p:nvPr>
+        </p:nvSpPr>
+        <p:spPr>
+          <a:xfrm>
+            <a:off x="6815138" y="2945001"/>
+            <a:ext cx="4535424" cy="3681539"/>
+          </a:xfrm>
+        </p:spPr>
+        <p:txBody>
+          <a:bodyPr/>
+          <a:lstStyle/>
+          <a:p>
+            <a:r>
+              <a:rPr lang="en-US" dirty="0"/>
+              <a:t>5 Area:</a:t>
+            </a:r>
+          </a:p>
+          <a:p>
+            <a:pPr lvl="1"/>
+            <a:r>
+              <a:rPr lang="en-US" dirty="0"/>
+              <a:t>Line Loss = 12.18kW</a:t>
+            </a:r>
+          </a:p>
+          <a:p>
+            <a:pPr lvl="1"/>
+            <a:r>
+              <a:rPr lang="en-US" dirty="0"/>
+              <a:t>Substation Power = 768.24kW</a:t>
+            </a:r>
+          </a:p>
+          <a:p>
+            <a:r>
+              <a:rPr lang="en-US" dirty="0"/>
+              <a:t>4 Area:</a:t>
+            </a:r>
+          </a:p>
+          <a:p>
+            <a:pPr lvl="1"/>
+            <a:r>
+              <a:rPr lang="en-US" dirty="0"/>
+              <a:t>Line Loss = 12.18kW</a:t>
+            </a:r>
+          </a:p>
+          <a:p>
+            <a:pPr lvl="1"/>
+            <a:r>
+              <a:rPr lang="en-US" dirty="0"/>
+              <a:t>Substation Power = 768.24kW</a:t>
+            </a:r>
+          </a:p>
+          <a:p>
+            <a:r>
+              <a:rPr lang="en-US" dirty="0"/>
+              <a:t>3 Area: </a:t>
+            </a:r>
+          </a:p>
+          <a:p>
+            <a:pPr lvl="1"/>
+            <a:r>
+              <a:rPr lang="en-US" dirty="0"/>
+              <a:t>Line Loss = 12.09kW</a:t>
+            </a:r>
+          </a:p>
+          <a:p>
+            <a:pPr lvl="1"/>
+            <a:r>
+              <a:rPr lang="en-US" dirty="0"/>
+              <a:t>Substation Power = 768.16kW</a:t>
+            </a:r>
+          </a:p>
+          <a:p>
+            <a:pPr lvl="1"/>
+            <a:endParaRPr lang="en-US" dirty="0"/>
+          </a:p>
+        </p:txBody>
+      </p:sp>
+      <p:sp>
+        <p:nvSpPr>
+          <p:cNvPr id="4" name="Title 3">
+            <a:extLst>
+              <a:ext uri="{FF2B5EF4-FFF2-40B4-BE49-F238E27FC236}">
+                <a16:creationId xmlns:a16="http://schemas.microsoft.com/office/drawing/2014/main" id="{FDA6A128-D30D-4F0B-A064-09B6DC7A7F1B}"/>
+              </a:ext>
+            </a:extLst>
+          </p:cNvPr>
+          <p:cNvSpPr>
+            <a:spLocks noGrp="1"/>
+          </p:cNvSpPr>
+          <p:nvPr>
+            <p:ph type="title"/>
+          </p:nvPr>
+        </p:nvSpPr>
+        <p:spPr>
+          <a:xfrm>
+            <a:off x="1781174" y="355078"/>
+            <a:ext cx="9348789" cy="1198149"/>
+          </a:xfrm>
+        </p:spPr>
+        <p:txBody>
+          <a:bodyPr>
+            <a:normAutofit fontScale="90000"/>
+          </a:bodyPr>
+          <a:lstStyle/>
+          <a:p>
+            <a:r>
+              <a:rPr lang="en-US" dirty="0"/>
+              <a:t>Some Test Runs over Different Area Divisions</a:t>
+            </a:r>
+          </a:p>
+        </p:txBody>
+      </p:sp>
+      <p:sp>
+        <p:nvSpPr>
+          <p:cNvPr id="8" name="Text Placeholder 7">
+            <a:extLst>
+              <a:ext uri="{FF2B5EF4-FFF2-40B4-BE49-F238E27FC236}">
+                <a16:creationId xmlns:a16="http://schemas.microsoft.com/office/drawing/2014/main" id="{E42E8E3B-BCC5-DE93-A305-78F8B21C3CC0}"/>
+              </a:ext>
+            </a:extLst>
+          </p:cNvPr>
+          <p:cNvSpPr>
+            <a:spLocks noGrp="1"/>
+          </p:cNvSpPr>
+          <p:nvPr>
+            <p:ph type="body" sz="quarter" idx="3"/>
+          </p:nvPr>
+        </p:nvSpPr>
+        <p:spPr/>
+        <p:txBody>
+          <a:bodyPr/>
+          <a:lstStyle/>
+          <a:p>
+            <a:endParaRPr lang="en-IN" dirty="0"/>
+          </a:p>
+        </p:txBody>
+      </p:sp>
+    </p:spTree>
+    <p:extLst>
+      <p:ext uri="{BB962C8B-B14F-4D97-AF65-F5344CB8AC3E}">
+        <p14:creationId xmlns:p14="http://schemas.microsoft.com/office/powerpoint/2010/main" val="2189263917"/>
+      </p:ext>
+    </p:extLst>
+  </p:cSld>
+  <p:clrMapOvr>
+    <a:masterClrMapping/>
+  </p:clrMapOvr>
+</p:sld>
+</file>
+
+<file path=ppt/slides/slide11.xml><?xml version="1.0" encoding="utf-8"?>
+<p:sld xmlns:a="http://schemas.openxmlformats.org/drawingml/2006/main" xmlns:r="http://schemas.openxmlformats.org/officeDocument/2006/relationships" xmlns:p="http://schemas.openxmlformats.org/presentationml/2006/main">
+  <p:cSld>
+    <p:spTree>
+      <p:nvGrpSpPr>
+        <p:cNvPr id="1" name=""/>
+        <p:cNvGrpSpPr/>
+        <p:nvPr/>
+      </p:nvGrpSpPr>
+      <p:grpSpPr>
+        <a:xfrm>
+          <a:off x="0" y="0"/>
+          <a:ext cx="0" cy="0"/>
+          <a:chOff x="0" y="0"/>
+          <a:chExt cx="0" cy="0"/>
+        </a:xfrm>
+      </p:grpSpPr>
+      <p:sp>
+        <p:nvSpPr>
+          <p:cNvPr id="2" name="Title 1">
+            <a:extLst>
+              <a:ext uri="{FF2B5EF4-FFF2-40B4-BE49-F238E27FC236}">
+                <a16:creationId xmlns:a16="http://schemas.microsoft.com/office/drawing/2014/main" id="{A3921E37-22FC-4845-87EE-5CDDC7718273}"/>
+              </a:ext>
+            </a:extLst>
+          </p:cNvPr>
+          <p:cNvSpPr>
+            <a:spLocks noGrp="1"/>
+          </p:cNvSpPr>
+          <p:nvPr>
+            <p:ph type="title"/>
+          </p:nvPr>
+        </p:nvSpPr>
+        <p:spPr>
+          <a:xfrm>
+            <a:off x="1781174" y="355078"/>
+            <a:ext cx="9348789" cy="1173471"/>
+          </a:xfrm>
+        </p:spPr>
+        <p:txBody>
+          <a:bodyPr/>
+          <a:lstStyle/>
+          <a:p>
+            <a:r>
+              <a:rPr lang="en-US" dirty="0"/>
+              <a:t>Next Objectives</a:t>
+            </a:r>
+          </a:p>
+        </p:txBody>
+      </p:sp>
+      <p:sp>
+        <p:nvSpPr>
+          <p:cNvPr id="4" name="TextBox 3">
+            <a:extLst>
+              <a:ext uri="{FF2B5EF4-FFF2-40B4-BE49-F238E27FC236}">
+                <a16:creationId xmlns:a16="http://schemas.microsoft.com/office/drawing/2014/main" id="{D1E3E8BE-0817-CBEC-D8ED-A348CB9C4168}"/>
+              </a:ext>
+            </a:extLst>
+          </p:cNvPr>
+          <p:cNvSpPr txBox="1"/>
+          <p:nvPr/>
+        </p:nvSpPr>
+        <p:spPr>
+          <a:xfrm>
+            <a:off x="2023672" y="2023225"/>
+            <a:ext cx="7821118" cy="2677656"/>
+          </a:xfrm>
+          <a:prstGeom prst="rect">
+            <a:avLst/>
+          </a:prstGeom>
+          <a:noFill/>
+        </p:spPr>
+        <p:txBody>
+          <a:bodyPr wrap="square">
             <a:spAutoFit/>
           </a:bodyPr>
           <a:lstStyle/>
           <a:p>
             <a:r>
-              <a:rPr lang="en-US"/>
-              <a:t>To get this text box to fit the text: right click on the text box, choose Format Text Effects, click the right symbol TextBox, click Do Not Auto Fit, then click Resize Shape to Fit Text, the box should conform to fit the text.</a:t>
-            </a:r>
-          </a:p>
-          <a:p>
-            <a:r>
-              <a:rPr lang="en-US"/>
-              <a:t>Actually helvetica fam offal typewriter hashtag blog. Intelligentsia bushwick activated charcoal 8-bit woke occupy taiyaki cred fingerstache green juice unicorn meggings tilde.</a:t>
+              <a:rPr lang="en-US" sz="2400" dirty="0"/>
+              <a:t>Desired objective(s):</a:t>
+            </a:r>
+          </a:p>
+          <a:p>
+            <a:pPr lvl="1"/>
+            <a:r>
+              <a:rPr lang="en-US" sz="2400" dirty="0"/>
+              <a:t>Incorporate battery storage into the algorithm using Multi-Period Optimization.</a:t>
+            </a:r>
+          </a:p>
+          <a:p>
+            <a:pPr lvl="1"/>
+            <a:r>
+              <a:rPr lang="en-US" sz="2400" dirty="0"/>
+              <a:t>Convert the code (currently in MATLAB) into Python/Julia.</a:t>
+            </a:r>
+          </a:p>
+          <a:p>
+            <a:pPr lvl="1"/>
+            <a:r>
+              <a:rPr lang="en-US" sz="2400" dirty="0"/>
+              <a:t>Later: Incorporate battery storage into a three-phase network.</a:t>
             </a:r>
             <a:endParaRPr lang="en-US" dirty="0"/>
           </a:p>
@@ -4673,7 +4741,7 @@
     </p:spTree>
     <p:extLst>
       <p:ext uri="{BB962C8B-B14F-4D97-AF65-F5344CB8AC3E}">
-        <p14:creationId xmlns:p14="http://schemas.microsoft.com/office/powerpoint/2010/main" val="3172430368"/>
+        <p14:creationId xmlns:p14="http://schemas.microsoft.com/office/powerpoint/2010/main" val="558608459"/>
       </p:ext>
     </p:extLst>
   </p:cSld>
@@ -4758,20 +4826,42 @@
             <a:pPr lvl="1"/>
             <a:r>
               <a:rPr lang="en-US" dirty="0"/>
-              <a:t>Single-phase power distribution network (Here the IEEE123 Node Test System)</a:t>
+              <a:t>Perform Distributed Optimal Power Flow on a Single-phase power distribution network.</a:t>
+            </a:r>
+          </a:p>
+          <a:p>
+            <a:r>
+              <a:rPr lang="en-US" dirty="0"/>
+              <a:t>Desired objective(s):</a:t>
             </a:r>
           </a:p>
           <a:p>
             <a:pPr lvl="1"/>
-            <a:endParaRPr lang="en-US" dirty="0"/>
+            <a:r>
+              <a:rPr lang="en-US" dirty="0"/>
+              <a:t>Incorporate battery storage into the algorithm.</a:t>
+            </a:r>
           </a:p>
           <a:p>
             <a:pPr lvl="1"/>
-            <a:endParaRPr lang="en-US" dirty="0"/>
-          </a:p>
-          <a:p>
-            <a:r>
-              <a:rPr lang="en-US" dirty="0"/>
+            <a:r>
+              <a:rPr lang="en-US" dirty="0"/>
+              <a:t>Convert the code (currently in MATLAB) into Python/Julia.</a:t>
+            </a:r>
+          </a:p>
+          <a:p>
+            <a:pPr lvl="1"/>
+            <a:r>
+              <a:rPr lang="en-US" dirty="0"/>
+              <a:t>Later: Incorporate battery storage into a three-phase network.</a:t>
+            </a:r>
+          </a:p>
+          <a:p>
+            <a:pPr marL="0" indent="0">
+              <a:buNone/>
+            </a:pPr>
+            <a:r>
+              <a:rPr lang="en-US" i="1" dirty="0"/>
               <a:t>This is based on the previous work by: </a:t>
             </a:r>
           </a:p>
@@ -4905,9 +4995,10 @@
           <a:lstStyle/>
           <a:p>
             <a:r>
-              <a:rPr lang="en-US" dirty="0"/>
+              <a:rPr lang="en-US"/>
               <a:t>Distributed Optimization in Distribution Systems</a:t>
             </a:r>
+            <a:endParaRPr lang="en-US" dirty="0"/>
           </a:p>
         </p:txBody>
       </p:sp>
@@ -4927,13 +5018,18 @@
             <p:ph idx="1"/>
           </p:nvPr>
         </p:nvSpPr>
-        <p:spPr/>
+        <p:spPr>
+          <a:xfrm>
+            <a:off x="1781175" y="2229633"/>
+            <a:ext cx="3660256" cy="1756378"/>
+          </a:xfrm>
+        </p:spPr>
         <p:txBody>
           <a:bodyPr/>
           <a:lstStyle/>
           <a:p>
             <a:r>
-              <a:rPr lang="en-US" dirty="0"/>
+              <a:rPr lang="en-US" b="1" dirty="0"/>
               <a:t>Current problem statement:</a:t>
             </a:r>
           </a:p>
@@ -4941,7 +5037,7 @@
             <a:pPr lvl="1"/>
             <a:r>
               <a:rPr lang="en-US" dirty="0"/>
-              <a:t>Single-phase power distribution network (Here the IEEE123 Node Test System)</a:t>
+              <a:t>Single-phase power distribution network (Here, the IEEE123 Node Test System)</a:t>
             </a:r>
           </a:p>
           <a:p>
@@ -4955,6 +5051,43 @@
           </a:p>
         </p:txBody>
       </p:sp>
+      <p:pic>
+        <p:nvPicPr>
+          <p:cNvPr id="5" name="Picture 4" descr="Diagram. &#10;IEEE 123 Node Test Feeder.">
+            <a:hlinkClick r:id="rId2"/>
+            <a:extLst>
+              <a:ext uri="{FF2B5EF4-FFF2-40B4-BE49-F238E27FC236}">
+                <a16:creationId xmlns:a16="http://schemas.microsoft.com/office/drawing/2014/main" id="{F3BB1098-C753-1B8B-3517-4016376D8014}"/>
+              </a:ext>
+            </a:extLst>
+          </p:cNvPr>
+          <p:cNvPicPr>
+            <a:picLocks noChangeAspect="1"/>
+          </p:cNvPicPr>
+          <p:nvPr/>
+        </p:nvPicPr>
+        <p:blipFill>
+          <a:blip r:embed="rId3">
+            <a:extLst>
+              <a:ext uri="{28A0092B-C50C-407E-A947-70E740481C1C}">
+                <a14:useLocalDpi xmlns:a14="http://schemas.microsoft.com/office/drawing/2010/main" val="0"/>
+              </a:ext>
+            </a:extLst>
+          </a:blip>
+          <a:stretch>
+            <a:fillRect/>
+          </a:stretch>
+        </p:blipFill>
+        <p:spPr>
+          <a:xfrm>
+            <a:off x="5717863" y="2101096"/>
+            <a:ext cx="5991225" cy="4248150"/>
+          </a:xfrm>
+          <a:prstGeom prst="rect">
+            <a:avLst/>
+          </a:prstGeom>
+        </p:spPr>
+      </p:pic>
     </p:spTree>
     <p:extLst>
       <p:ext uri="{BB962C8B-B14F-4D97-AF65-F5344CB8AC3E}">
@@ -4987,10 +5120,10 @@
       </p:grpSpPr>
       <p:sp>
         <p:nvSpPr>
-          <p:cNvPr id="3" name="Text Placeholder 2">
-            <a:extLst>
-              <a:ext uri="{FF2B5EF4-FFF2-40B4-BE49-F238E27FC236}">
-                <a16:creationId xmlns:a16="http://schemas.microsoft.com/office/drawing/2014/main" id="{799C5043-70C7-42B6-BC83-DD09FFA9C12A}"/>
+          <p:cNvPr id="3" name="Title 2">
+            <a:extLst>
+              <a:ext uri="{FF2B5EF4-FFF2-40B4-BE49-F238E27FC236}">
+                <a16:creationId xmlns:a16="http://schemas.microsoft.com/office/drawing/2014/main" id="{2B351BEF-2A59-4268-968D-5C8F03B9F3D2}"/>
               </a:ext>
             </a:extLst>
           </p:cNvPr>
@@ -4998,33 +5131,27 @@
             <a:spLocks noGrp="1"/>
           </p:cNvSpPr>
           <p:nvPr>
-            <p:ph type="body" idx="1"/>
-          </p:nvPr>
-        </p:nvSpPr>
-        <p:spPr>
-          <a:xfrm>
-            <a:off x="1781174" y="3429000"/>
-            <a:ext cx="9348788" cy="1543050"/>
-          </a:xfrm>
-        </p:spPr>
+            <p:ph type="title"/>
+          </p:nvPr>
+        </p:nvSpPr>
+        <p:spPr/>
         <p:txBody>
           <a:bodyPr/>
           <a:lstStyle/>
           <a:p>
             <a:r>
-              <a:rPr lang="en-US"/>
-              <a:t>Pour-over kinfolk </a:t>
-            </a:r>
-            <a:endParaRPr lang="en-US" dirty="0"/>
-          </a:p>
-        </p:txBody>
-      </p:sp>
-      <p:sp>
-        <p:nvSpPr>
-          <p:cNvPr id="2" name="Title 1">
-            <a:extLst>
-              <a:ext uri="{FF2B5EF4-FFF2-40B4-BE49-F238E27FC236}">
-                <a16:creationId xmlns:a16="http://schemas.microsoft.com/office/drawing/2014/main" id="{2CFEBE16-0972-41CE-A8FA-A2F80D8FFFBB}"/>
+              <a:rPr lang="en-US" dirty="0"/>
+              <a:t>Distributed Optimization in Distribution Systems</a:t>
+            </a:r>
+          </a:p>
+        </p:txBody>
+      </p:sp>
+      <p:sp>
+        <p:nvSpPr>
+          <p:cNvPr id="2" name="Content Placeholder 1">
+            <a:extLst>
+              <a:ext uri="{FF2B5EF4-FFF2-40B4-BE49-F238E27FC236}">
+                <a16:creationId xmlns:a16="http://schemas.microsoft.com/office/drawing/2014/main" id="{D8C7C84E-A439-4B2A-94CE-26B4E69CC91C}"/>
               </a:ext>
             </a:extLst>
           </p:cNvPr>
@@ -5032,13 +5159,13 @@
             <a:spLocks noGrp="1"/>
           </p:cNvSpPr>
           <p:nvPr>
-            <p:ph type="title"/>
-          </p:nvPr>
-        </p:nvSpPr>
-        <p:spPr>
-          <a:xfrm>
-            <a:off x="1781174" y="1104900"/>
-            <a:ext cx="9348789" cy="1697120"/>
+            <p:ph idx="1"/>
+          </p:nvPr>
+        </p:nvSpPr>
+        <p:spPr>
+          <a:xfrm>
+            <a:off x="1781175" y="2229633"/>
+            <a:ext cx="3660256" cy="1756378"/>
           </a:xfrm>
         </p:spPr>
         <p:txBody>
@@ -5046,17 +5173,69 @@
           <a:lstStyle/>
           <a:p>
             <a:r>
-              <a:rPr lang="en-US"/>
-              <a:t>FASHION AXE VHS COLORING BOOK</a:t>
-            </a:r>
+              <a:rPr lang="en-US" b="1" dirty="0"/>
+              <a:t>Current problem statement:</a:t>
+            </a:r>
+          </a:p>
+          <a:p>
+            <a:pPr lvl="1"/>
+            <a:r>
+              <a:rPr lang="en-US" dirty="0"/>
+              <a:t>Divide the network into several areas in order to solve for their Optimal Power Flow solutions separately, with exchange of boundary variables after every ‘macro-iteration’.</a:t>
+            </a:r>
+          </a:p>
+          <a:p>
+            <a:pPr marL="0" indent="0">
+              <a:buNone/>
+            </a:pPr>
             <a:endParaRPr lang="en-US" dirty="0"/>
           </a:p>
-        </p:txBody>
-      </p:sp>
+          <a:p>
+            <a:endParaRPr lang="en-US" dirty="0"/>
+          </a:p>
+        </p:txBody>
+      </p:sp>
+      <p:pic>
+        <p:nvPicPr>
+          <p:cNvPr id="6" name="Picture 5" descr="Diagram&#10;&#10;IEEE 123 Node Test Feeder divided into four Areas.">
+            <a:hlinkClick r:id="rId2"/>
+            <a:extLst>
+              <a:ext uri="{FF2B5EF4-FFF2-40B4-BE49-F238E27FC236}">
+                <a16:creationId xmlns:a16="http://schemas.microsoft.com/office/drawing/2014/main" id="{3AE44657-C62E-2C08-8BA2-2A0608D8FC96}"/>
+              </a:ext>
+            </a:extLst>
+          </p:cNvPr>
+          <p:cNvPicPr>
+            <a:picLocks noChangeAspect="1"/>
+          </p:cNvPicPr>
+          <p:nvPr/>
+        </p:nvPicPr>
+        <p:blipFill>
+          <a:blip r:embed="rId3">
+            <a:extLst>
+              <a:ext uri="{28A0092B-C50C-407E-A947-70E740481C1C}">
+                <a14:useLocalDpi xmlns:a14="http://schemas.microsoft.com/office/drawing/2010/main" val="0"/>
+              </a:ext>
+            </a:extLst>
+          </a:blip>
+          <a:stretch>
+            <a:fillRect/>
+          </a:stretch>
+        </p:blipFill>
+        <p:spPr>
+          <a:xfrm>
+            <a:off x="6230911" y="2229633"/>
+            <a:ext cx="5238750" cy="3609975"/>
+          </a:xfrm>
+          <a:prstGeom prst="rect">
+            <a:avLst/>
+          </a:prstGeom>
+        </p:spPr>
+      </p:pic>
     </p:spTree>
     <p:extLst>
       <p:ext uri="{BB962C8B-B14F-4D97-AF65-F5344CB8AC3E}">
-        <p14:creationId xmlns:p14="http://schemas.microsoft.com/office/powerpoint/2010/main" val="3573548137"/>
+        <p14:creationId xmlns:p14="http://schemas.microsoft.com/office/powerpoint/2010/main" val="1858411754"/>
       </p:ext>
     </p:extLst>
   </p:cSld>
@@ -5085,10 +5264,10 @@
       </p:grpSpPr>
       <p:sp>
         <p:nvSpPr>
-          <p:cNvPr id="5" name="Content Placeholder 4">
-            <a:extLst>
-              <a:ext uri="{FF2B5EF4-FFF2-40B4-BE49-F238E27FC236}">
-                <a16:creationId xmlns:a16="http://schemas.microsoft.com/office/drawing/2014/main" id="{CAF4E33B-142F-4A0B-86CF-9E36E699BF1B}"/>
+          <p:cNvPr id="3" name="Title 2">
+            <a:extLst>
+              <a:ext uri="{FF2B5EF4-FFF2-40B4-BE49-F238E27FC236}">
+                <a16:creationId xmlns:a16="http://schemas.microsoft.com/office/drawing/2014/main" id="{2B351BEF-2A59-4268-968D-5C8F03B9F3D2}"/>
               </a:ext>
             </a:extLst>
           </p:cNvPr>
@@ -5096,85 +5275,27 @@
             <a:spLocks noGrp="1"/>
           </p:cNvSpPr>
           <p:nvPr>
-            <p:ph sz="half" idx="1"/>
-          </p:nvPr>
-        </p:nvSpPr>
-        <p:spPr>
-          <a:xfrm>
-            <a:off x="1781175" y="2161522"/>
-            <a:ext cx="4589480" cy="4276855"/>
-          </a:xfrm>
-        </p:spPr>
+            <p:ph type="title"/>
+          </p:nvPr>
+        </p:nvSpPr>
+        <p:spPr/>
         <p:txBody>
           <a:bodyPr/>
           <a:lstStyle/>
           <a:p>
             <a:r>
               <a:rPr lang="en-US" dirty="0"/>
-              <a:t>Bespoke </a:t>
-            </a:r>
-            <a:r>
-              <a:rPr lang="en-US" dirty="0" err="1"/>
-              <a:t>pok</a:t>
-            </a:r>
-            <a:r>
-              <a:rPr lang="en-US" dirty="0"/>
-              <a:t> </a:t>
-            </a:r>
-            <a:r>
-              <a:rPr lang="en-US" dirty="0" err="1"/>
-              <a:t>pok</a:t>
-            </a:r>
-            <a:r>
-              <a:rPr lang="en-US" dirty="0"/>
-              <a:t> slow-carb </a:t>
-            </a:r>
-          </a:p>
-          <a:p>
-            <a:r>
-              <a:rPr lang="en-US" dirty="0"/>
-              <a:t>Man braid </a:t>
-            </a:r>
-            <a:r>
-              <a:rPr lang="en-US" dirty="0" err="1"/>
-              <a:t>truffaut</a:t>
-            </a:r>
-            <a:r>
-              <a:rPr lang="en-US" dirty="0"/>
-              <a:t> intelligentsia </a:t>
-            </a:r>
-          </a:p>
-          <a:p>
-            <a:r>
-              <a:rPr lang="en-US" dirty="0"/>
-              <a:t>Skateboard </a:t>
-            </a:r>
-          </a:p>
-          <a:p>
-            <a:r>
-              <a:rPr lang="en-US" dirty="0"/>
-              <a:t>Brooklyn synth chambray </a:t>
-            </a:r>
-          </a:p>
-          <a:p>
-            <a:r>
-              <a:rPr lang="en-US" dirty="0"/>
-              <a:t>Cold-pressed fam </a:t>
-            </a:r>
-            <a:r>
-              <a:rPr lang="en-US" dirty="0" err="1"/>
-              <a:t>stumptown</a:t>
-            </a:r>
-            <a:endParaRPr lang="en-US" dirty="0"/>
-          </a:p>
-        </p:txBody>
-      </p:sp>
-      <p:sp>
-        <p:nvSpPr>
-          <p:cNvPr id="6" name="Content Placeholder 5">
-            <a:extLst>
-              <a:ext uri="{FF2B5EF4-FFF2-40B4-BE49-F238E27FC236}">
-                <a16:creationId xmlns:a16="http://schemas.microsoft.com/office/drawing/2014/main" id="{8795B178-DDDF-494B-AC60-2D8C9442C519}"/>
+              <a:t>Distributed Optimization in Distribution Systems</a:t>
+            </a:r>
+          </a:p>
+        </p:txBody>
+      </p:sp>
+      <p:sp>
+        <p:nvSpPr>
+          <p:cNvPr id="2" name="Content Placeholder 1">
+            <a:extLst>
+              <a:ext uri="{FF2B5EF4-FFF2-40B4-BE49-F238E27FC236}">
+                <a16:creationId xmlns:a16="http://schemas.microsoft.com/office/drawing/2014/main" id="{D8C7C84E-A439-4B2A-94CE-26B4E69CC91C}"/>
               </a:ext>
             </a:extLst>
           </p:cNvPr>
@@ -5182,13 +5303,13 @@
             <a:spLocks noGrp="1"/>
           </p:cNvSpPr>
           <p:nvPr>
-            <p:ph sz="half" idx="2"/>
-          </p:nvPr>
-        </p:nvSpPr>
-        <p:spPr>
-          <a:xfrm>
-            <a:off x="6815136" y="2161522"/>
-            <a:ext cx="4931387" cy="4276855"/>
+            <p:ph idx="1"/>
+          </p:nvPr>
+        </p:nvSpPr>
+        <p:spPr>
+          <a:xfrm>
+            <a:off x="1249652" y="2109682"/>
+            <a:ext cx="3660256" cy="1756378"/>
           </a:xfrm>
         </p:spPr>
         <p:txBody>
@@ -5196,85 +5317,93 @@
           <a:lstStyle/>
           <a:p>
             <a:r>
-              <a:rPr lang="en-US" dirty="0"/>
-              <a:t>8-bit freegan </a:t>
-            </a:r>
-            <a:r>
-              <a:rPr lang="en-US" dirty="0" err="1"/>
-              <a:t>marfa</a:t>
-            </a:r>
-            <a:r>
-              <a:rPr lang="en-US" dirty="0"/>
-              <a:t> </a:t>
-            </a:r>
-          </a:p>
-          <a:p>
-            <a:r>
-              <a:rPr lang="en-US" dirty="0"/>
-              <a:t>Chartreuse</a:t>
-            </a:r>
-          </a:p>
-          <a:p>
-            <a:r>
-              <a:rPr lang="en-US" dirty="0"/>
-              <a:t>Helvetica fam </a:t>
-            </a:r>
-            <a:r>
-              <a:rPr lang="en-US" dirty="0" err="1"/>
-              <a:t>schlitz</a:t>
-            </a:r>
-            <a:r>
-              <a:rPr lang="en-US" dirty="0"/>
-              <a:t>, pickled </a:t>
-            </a:r>
-          </a:p>
-          <a:p>
-            <a:r>
-              <a:rPr lang="en-US" dirty="0"/>
-              <a:t>Letterpress vegan asymmetrical</a:t>
-            </a:r>
-          </a:p>
-        </p:txBody>
-      </p:sp>
-      <p:sp>
-        <p:nvSpPr>
-          <p:cNvPr id="4" name="Title 3">
-            <a:extLst>
-              <a:ext uri="{FF2B5EF4-FFF2-40B4-BE49-F238E27FC236}">
-                <a16:creationId xmlns:a16="http://schemas.microsoft.com/office/drawing/2014/main" id="{FDA6A128-D30D-4F0B-A064-09B6DC7A7F1B}"/>
-              </a:ext>
-            </a:extLst>
-          </p:cNvPr>
-          <p:cNvSpPr>
-            <a:spLocks noGrp="1"/>
-          </p:cNvSpPr>
-          <p:nvPr>
-            <p:ph type="title"/>
-          </p:nvPr>
-        </p:nvSpPr>
-        <p:spPr>
-          <a:xfrm>
-            <a:off x="1781174" y="355078"/>
-            <a:ext cx="9348789" cy="1185623"/>
-          </a:xfrm>
-        </p:spPr>
-        <p:txBody>
-          <a:bodyPr>
-            <a:normAutofit fontScale="90000"/>
-          </a:bodyPr>
-          <a:lstStyle/>
-          <a:p>
-            <a:r>
-              <a:rPr lang="en-US" dirty="0"/>
-              <a:t>BROUGHT GOOD ALSO ITSELF WINGED GREAT</a:t>
-            </a:r>
-          </a:p>
-        </p:txBody>
-      </p:sp>
+              <a:rPr lang="en-US" b="1" dirty="0"/>
+              <a:t>Current problem statement:</a:t>
+            </a:r>
+          </a:p>
+          <a:p>
+            <a:pPr lvl="1"/>
+            <a:r>
+              <a:rPr lang="en-US" dirty="0"/>
+              <a:t>Perform a ‘Distributed OPF’ for minimizing line losses for each area. After every macro-iteration, exchange border variables between connected areas.</a:t>
+            </a:r>
+          </a:p>
+          <a:p>
+            <a:pPr marL="0" indent="0">
+              <a:buNone/>
+            </a:pPr>
+            <a:endParaRPr lang="en-US" dirty="0"/>
+          </a:p>
+          <a:p>
+            <a:endParaRPr lang="en-US" dirty="0"/>
+          </a:p>
+        </p:txBody>
+      </p:sp>
+      <p:pic>
+        <p:nvPicPr>
+          <p:cNvPr id="5" name="Picture 4" descr="Set of formulae.&#10;Optimization Problem for one Area.">
+            <a:hlinkClick r:id="rId2"/>
+            <a:extLst>
+              <a:ext uri="{FF2B5EF4-FFF2-40B4-BE49-F238E27FC236}">
+                <a16:creationId xmlns:a16="http://schemas.microsoft.com/office/drawing/2014/main" id="{533ABF24-688A-C2DC-7D60-A8E2C40482ED}"/>
+              </a:ext>
+            </a:extLst>
+          </p:cNvPr>
+          <p:cNvPicPr>
+            <a:picLocks noChangeAspect="1"/>
+          </p:cNvPicPr>
+          <p:nvPr/>
+        </p:nvPicPr>
+        <p:blipFill rotWithShape="1">
+          <a:blip r:embed="rId3"/>
+          <a:srcRect r="16533"/>
+          <a:stretch/>
+        </p:blipFill>
+        <p:spPr>
+          <a:xfrm>
+            <a:off x="4909907" y="2109682"/>
+            <a:ext cx="3866770" cy="4134810"/>
+          </a:xfrm>
+          <a:prstGeom prst="rect">
+            <a:avLst/>
+          </a:prstGeom>
+        </p:spPr>
+      </p:pic>
+      <p:pic>
+        <p:nvPicPr>
+          <p:cNvPr id="8" name="Picture 7" descr="Diagram.&#10;Exchange of border variables among connecting Areas after every macro-iteration.">
+            <a:hlinkClick r:id="rId4"/>
+            <a:extLst>
+              <a:ext uri="{FF2B5EF4-FFF2-40B4-BE49-F238E27FC236}">
+                <a16:creationId xmlns:a16="http://schemas.microsoft.com/office/drawing/2014/main" id="{026154E6-E649-6D94-BC4A-1C6F99E15EF5}"/>
+              </a:ext>
+            </a:extLst>
+          </p:cNvPr>
+          <p:cNvPicPr>
+            <a:picLocks noChangeAspect="1"/>
+          </p:cNvPicPr>
+          <p:nvPr/>
+        </p:nvPicPr>
+        <p:blipFill>
+          <a:blip r:embed="rId5"/>
+          <a:stretch>
+            <a:fillRect/>
+          </a:stretch>
+        </p:blipFill>
+        <p:spPr>
+          <a:xfrm>
+            <a:off x="8565919" y="2109682"/>
+            <a:ext cx="3276624" cy="2166953"/>
+          </a:xfrm>
+          <a:prstGeom prst="rect">
+            <a:avLst/>
+          </a:prstGeom>
+        </p:spPr>
+      </p:pic>
     </p:spTree>
     <p:extLst>
       <p:ext uri="{BB962C8B-B14F-4D97-AF65-F5344CB8AC3E}">
-        <p14:creationId xmlns:p14="http://schemas.microsoft.com/office/powerpoint/2010/main" val="1735641184"/>
+        <p14:creationId xmlns:p14="http://schemas.microsoft.com/office/powerpoint/2010/main" val="2978105291"/>
       </p:ext>
     </p:extLst>
   </p:cSld>
@@ -5303,10 +5432,10 @@
       </p:grpSpPr>
       <p:sp>
         <p:nvSpPr>
-          <p:cNvPr id="2" name="Text Placeholder 1">
-            <a:extLst>
-              <a:ext uri="{FF2B5EF4-FFF2-40B4-BE49-F238E27FC236}">
-                <a16:creationId xmlns:a16="http://schemas.microsoft.com/office/drawing/2014/main" id="{09DF75FC-4792-41CB-958E-7EED40C8FDA9}"/>
+          <p:cNvPr id="3" name="Text Placeholder 2">
+            <a:extLst>
+              <a:ext uri="{FF2B5EF4-FFF2-40B4-BE49-F238E27FC236}">
+                <a16:creationId xmlns:a16="http://schemas.microsoft.com/office/drawing/2014/main" id="{799C5043-70C7-42B6-BC83-DD09FFA9C12A}"/>
               </a:ext>
             </a:extLst>
           </p:cNvPr>
@@ -5319,27 +5448,39 @@
         </p:nvSpPr>
         <p:spPr>
           <a:xfrm>
-            <a:off x="1781175" y="1923911"/>
-            <a:ext cx="4537075" cy="806904"/>
+            <a:off x="1781174" y="3429000"/>
+            <a:ext cx="9348788" cy="1543050"/>
           </a:xfrm>
         </p:spPr>
         <p:txBody>
           <a:bodyPr/>
           <a:lstStyle/>
           <a:p>
-            <a:r>
-              <a:rPr lang="en-US" dirty="0"/>
-              <a:t>Pinterest fanny pack Stumptown activated charcoal</a:t>
-            </a:r>
-          </a:p>
-        </p:txBody>
-      </p:sp>
-      <p:sp>
-        <p:nvSpPr>
-          <p:cNvPr id="5" name="Content Placeholder 4">
-            <a:extLst>
-              <a:ext uri="{FF2B5EF4-FFF2-40B4-BE49-F238E27FC236}">
-                <a16:creationId xmlns:a16="http://schemas.microsoft.com/office/drawing/2014/main" id="{CAF4E33B-142F-4A0B-86CF-9E36E699BF1B}"/>
+            <a:pPr algn="l"/>
+            <a:r>
+              <a:rPr lang="en-US" sz="2800" dirty="0"/>
+              <a:t>The Distributed Optimization Algorithm was run on the IEEE 123 Node Test Feeder, which was divided into three, four and five Areas in separate runs. </a:t>
+            </a:r>
+          </a:p>
+          <a:p>
+            <a:pPr algn="l"/>
+            <a:r>
+              <a:rPr lang="en-US" sz="2800" dirty="0"/>
+              <a:t>This was to check if the results of the algorithm are consistent irrespective of the number of areas the system was divided into</a:t>
+            </a:r>
+            <a:r>
+              <a:rPr lang="en-US" dirty="0"/>
+              <a:t>.</a:t>
+            </a:r>
+          </a:p>
+        </p:txBody>
+      </p:sp>
+      <p:sp>
+        <p:nvSpPr>
+          <p:cNvPr id="2" name="Title 1">
+            <a:extLst>
+              <a:ext uri="{FF2B5EF4-FFF2-40B4-BE49-F238E27FC236}">
+                <a16:creationId xmlns:a16="http://schemas.microsoft.com/office/drawing/2014/main" id="{2CFEBE16-0972-41CE-A8FA-A2F80D8FFFBB}"/>
               </a:ext>
             </a:extLst>
           </p:cNvPr>
@@ -5347,13 +5488,13 @@
             <a:spLocks noGrp="1"/>
           </p:cNvSpPr>
           <p:nvPr>
-            <p:ph sz="half" idx="2"/>
-          </p:nvPr>
-        </p:nvSpPr>
-        <p:spPr>
-          <a:xfrm>
-            <a:off x="1781175" y="2944164"/>
-            <a:ext cx="4537075" cy="3649357"/>
+            <p:ph type="title"/>
+          </p:nvPr>
+        </p:nvSpPr>
+        <p:spPr>
+          <a:xfrm>
+            <a:off x="1781174" y="1104900"/>
+            <a:ext cx="9348789" cy="1697120"/>
           </a:xfrm>
         </p:spPr>
         <p:txBody>
@@ -5362,195 +5503,7 @@
           <a:p>
             <a:r>
               <a:rPr lang="en-US" dirty="0"/>
-              <a:t>Bespoke </a:t>
-            </a:r>
-            <a:r>
-              <a:rPr lang="en-US" dirty="0" err="1"/>
-              <a:t>pok</a:t>
-            </a:r>
-            <a:r>
-              <a:rPr lang="en-US" dirty="0"/>
-              <a:t> </a:t>
-            </a:r>
-            <a:r>
-              <a:rPr lang="en-US" dirty="0" err="1"/>
-              <a:t>pok</a:t>
-            </a:r>
-            <a:r>
-              <a:rPr lang="en-US" dirty="0"/>
-              <a:t> slow-carb </a:t>
-            </a:r>
-          </a:p>
-          <a:p>
-            <a:r>
-              <a:rPr lang="en-US" dirty="0"/>
-              <a:t>Man braid </a:t>
-            </a:r>
-            <a:r>
-              <a:rPr lang="en-US" dirty="0" err="1"/>
-              <a:t>truffaut</a:t>
-            </a:r>
-            <a:r>
-              <a:rPr lang="en-US" dirty="0"/>
-              <a:t> intelligentsia </a:t>
-            </a:r>
-          </a:p>
-          <a:p>
-            <a:r>
-              <a:rPr lang="en-US" dirty="0"/>
-              <a:t>Skateboard </a:t>
-            </a:r>
-          </a:p>
-          <a:p>
-            <a:r>
-              <a:rPr lang="en-US" dirty="0"/>
-              <a:t>Brooklyn synth chambray </a:t>
-            </a:r>
-          </a:p>
-          <a:p>
-            <a:r>
-              <a:rPr lang="en-US" dirty="0"/>
-              <a:t>Cold-pressed fam </a:t>
-            </a:r>
-            <a:r>
-              <a:rPr lang="en-US" dirty="0" err="1"/>
-              <a:t>stumptown</a:t>
-            </a:r>
-            <a:endParaRPr lang="en-US" dirty="0"/>
-          </a:p>
-        </p:txBody>
-      </p:sp>
-      <p:sp>
-        <p:nvSpPr>
-          <p:cNvPr id="3" name="Text Placeholder 2">
-            <a:extLst>
-              <a:ext uri="{FF2B5EF4-FFF2-40B4-BE49-F238E27FC236}">
-                <a16:creationId xmlns:a16="http://schemas.microsoft.com/office/drawing/2014/main" id="{2DDC3E97-760B-4CC1-BFE6-47DC7453C8BE}"/>
-              </a:ext>
-            </a:extLst>
-          </p:cNvPr>
-          <p:cNvSpPr>
-            <a:spLocks noGrp="1"/>
-          </p:cNvSpPr>
-          <p:nvPr>
-            <p:ph type="body" sz="quarter" idx="3"/>
-          </p:nvPr>
-        </p:nvSpPr>
-        <p:spPr>
-          <a:xfrm>
-            <a:off x="6815138" y="1913026"/>
-            <a:ext cx="4561114" cy="817789"/>
-          </a:xfrm>
-        </p:spPr>
-        <p:txBody>
-          <a:bodyPr/>
-          <a:lstStyle/>
-          <a:p>
-            <a:r>
-              <a:rPr lang="en-US" dirty="0"/>
-              <a:t>Locavore cardigan jean shorts asymmetrical </a:t>
-            </a:r>
-          </a:p>
-        </p:txBody>
-      </p:sp>
-      <p:sp>
-        <p:nvSpPr>
-          <p:cNvPr id="6" name="Content Placeholder 5">
-            <a:extLst>
-              <a:ext uri="{FF2B5EF4-FFF2-40B4-BE49-F238E27FC236}">
-                <a16:creationId xmlns:a16="http://schemas.microsoft.com/office/drawing/2014/main" id="{8795B178-DDDF-494B-AC60-2D8C9442C519}"/>
-              </a:ext>
-            </a:extLst>
-          </p:cNvPr>
-          <p:cNvSpPr>
-            <a:spLocks noGrp="1"/>
-          </p:cNvSpPr>
-          <p:nvPr>
-            <p:ph sz="quarter" idx="4"/>
-          </p:nvPr>
-        </p:nvSpPr>
-        <p:spPr>
-          <a:xfrm>
-            <a:off x="6815138" y="2945001"/>
-            <a:ext cx="4535424" cy="3681539"/>
-          </a:xfrm>
-        </p:spPr>
-        <p:txBody>
-          <a:bodyPr/>
-          <a:lstStyle/>
-          <a:p>
-            <a:r>
-              <a:rPr lang="en-US" dirty="0"/>
-              <a:t>8-bit freegan </a:t>
-            </a:r>
-            <a:r>
-              <a:rPr lang="en-US" dirty="0" err="1"/>
-              <a:t>marfa</a:t>
-            </a:r>
-            <a:r>
-              <a:rPr lang="en-US" dirty="0"/>
-              <a:t> </a:t>
-            </a:r>
-          </a:p>
-          <a:p>
-            <a:r>
-              <a:rPr lang="en-US" dirty="0"/>
-              <a:t>Chartreuse</a:t>
-            </a:r>
-          </a:p>
-          <a:p>
-            <a:r>
-              <a:rPr lang="en-US" dirty="0"/>
-              <a:t>Helvetica fam </a:t>
-            </a:r>
-            <a:r>
-              <a:rPr lang="en-US" dirty="0" err="1"/>
-              <a:t>schlitz</a:t>
-            </a:r>
-            <a:r>
-              <a:rPr lang="en-US" dirty="0"/>
-              <a:t>, pickled </a:t>
-            </a:r>
-          </a:p>
-          <a:p>
-            <a:r>
-              <a:rPr lang="en-US" dirty="0"/>
-              <a:t>Letterpress vegan asymmetrical</a:t>
-            </a:r>
-          </a:p>
-        </p:txBody>
-      </p:sp>
-      <p:sp>
-        <p:nvSpPr>
-          <p:cNvPr id="4" name="Title 3">
-            <a:extLst>
-              <a:ext uri="{FF2B5EF4-FFF2-40B4-BE49-F238E27FC236}">
-                <a16:creationId xmlns:a16="http://schemas.microsoft.com/office/drawing/2014/main" id="{FDA6A128-D30D-4F0B-A064-09B6DC7A7F1B}"/>
-              </a:ext>
-            </a:extLst>
-          </p:cNvPr>
-          <p:cNvSpPr>
-            <a:spLocks noGrp="1"/>
-          </p:cNvSpPr>
-          <p:nvPr>
-            <p:ph type="title"/>
-          </p:nvPr>
-        </p:nvSpPr>
-        <p:spPr>
-          <a:xfrm>
-            <a:off x="1781174" y="355078"/>
-            <a:ext cx="9348789" cy="1198149"/>
-          </a:xfrm>
-        </p:spPr>
-        <p:txBody>
-          <a:bodyPr>
-            <a:normAutofit fontScale="90000"/>
-          </a:bodyPr>
-          <a:lstStyle/>
-          <a:p>
-            <a:r>
-              <a:rPr lang="en-US" dirty="0"/>
-              <a:t>BROUGHT GOOD ALSO ITSELF WINGED GREAT</a:t>
+              <a:t>Some test runs over different area divisions</a:t>
             </a:r>
           </a:p>
         </p:txBody>
@@ -5558,7 +5511,7 @@
     </p:spTree>
     <p:extLst>
       <p:ext uri="{BB962C8B-B14F-4D97-AF65-F5344CB8AC3E}">
-        <p14:creationId xmlns:p14="http://schemas.microsoft.com/office/powerpoint/2010/main" val="2189263917"/>
+        <p14:creationId xmlns:p14="http://schemas.microsoft.com/office/powerpoint/2010/main" val="3573548137"/>
       </p:ext>
     </p:extLst>
   </p:cSld>
@@ -5571,6 +5524,14 @@
 <file path=ppt/slides/slide7.xml><?xml version="1.0" encoding="utf-8"?>
 <p:sld xmlns:a="http://schemas.openxmlformats.org/drawingml/2006/main" xmlns:r="http://schemas.openxmlformats.org/officeDocument/2006/relationships" xmlns:p="http://schemas.openxmlformats.org/presentationml/2006/main">
   <p:cSld>
+    <p:bg>
+      <p:bgPr>
+        <a:solidFill>
+          <a:schemeClr val="bg1"/>
+        </a:solidFill>
+        <a:effectLst/>
+      </p:bgPr>
+    </p:bg>
     <p:spTree>
       <p:nvGrpSpPr>
         <p:cNvPr id="1" name=""/>
@@ -5587,10 +5548,212 @@
       </p:grpSpPr>
       <p:sp>
         <p:nvSpPr>
-          <p:cNvPr id="2" name="Title 1">
-            <a:extLst>
-              <a:ext uri="{FF2B5EF4-FFF2-40B4-BE49-F238E27FC236}">
-                <a16:creationId xmlns:a16="http://schemas.microsoft.com/office/drawing/2014/main" id="{A3921E37-22FC-4845-87EE-5CDDC7718273}"/>
+          <p:cNvPr id="17" name="Rectangle 16">
+            <a:extLst>
+              <a:ext uri="{FF2B5EF4-FFF2-40B4-BE49-F238E27FC236}">
+                <a16:creationId xmlns:a16="http://schemas.microsoft.com/office/drawing/2014/main" id="{02D44074-0B69-4F0C-A7B3-5645CE40D8E3}"/>
+              </a:ext>
+              <a:ext uri="{C183D7F6-B498-43B3-948B-1728B52AA6E4}">
+                <adec:decorative xmlns:adec="http://schemas.microsoft.com/office/drawing/2017/decorative" val="1"/>
+              </a:ext>
+            </a:extLst>
+          </p:cNvPr>
+          <p:cNvSpPr>
+            <a:spLocks noGrp="1" noRot="1" noChangeAspect="1" noMove="1" noResize="1" noEditPoints="1" noAdjustHandles="1" noChangeArrowheads="1" noChangeShapeType="1" noTextEdit="1"/>
+          </p:cNvSpPr>
+          <p:nvPr>
+            <p:extLst>
+              <p:ext uri="{386F3935-93C4-4BCD-93E2-E3B085C9AB24}">
+                <p16:designElem xmlns:p16="http://schemas.microsoft.com/office/powerpoint/2015/main" val="1"/>
+              </p:ext>
+            </p:extLst>
+          </p:nvPr>
+        </p:nvSpPr>
+        <p:spPr>
+          <a:xfrm>
+            <a:off x="7534656" y="0"/>
+            <a:ext cx="4657344" cy="6858000"/>
+          </a:xfrm>
+          <a:prstGeom prst="rect">
+            <a:avLst/>
+          </a:prstGeom>
+          <a:ln>
+            <a:noFill/>
+          </a:ln>
+        </p:spPr>
+        <p:style>
+          <a:lnRef idx="2">
+            <a:schemeClr val="accent1">
+              <a:shade val="50000"/>
+            </a:schemeClr>
+          </a:lnRef>
+          <a:fillRef idx="1">
+            <a:schemeClr val="accent1"/>
+          </a:fillRef>
+          <a:effectRef idx="0">
+            <a:schemeClr val="accent1"/>
+          </a:effectRef>
+          <a:fontRef idx="minor">
+            <a:schemeClr val="lt1"/>
+          </a:fontRef>
+        </p:style>
+        <p:txBody>
+          <a:bodyPr rtlCol="0" anchor="ctr"/>
+          <a:lstStyle/>
+          <a:p>
+            <a:pPr algn="ctr"/>
+            <a:endParaRPr lang="en-US"/>
+          </a:p>
+        </p:txBody>
+      </p:sp>
+      <p:pic>
+        <p:nvPicPr>
+          <p:cNvPr id="3" name="Content Placeholder 2" descr="Chart, scatter chart&#10;&#10;Description automatically generated">
+            <a:extLst>
+              <a:ext uri="{FF2B5EF4-FFF2-40B4-BE49-F238E27FC236}">
+                <a16:creationId xmlns:a16="http://schemas.microsoft.com/office/drawing/2014/main" id="{D7AAB38C-CD03-7277-B9EC-423C48C614C8}"/>
+              </a:ext>
+            </a:extLst>
+          </p:cNvPr>
+          <p:cNvPicPr>
+            <a:picLocks noGrp="1" noChangeAspect="1"/>
+          </p:cNvPicPr>
+          <p:nvPr>
+            <p:ph sz="half" idx="1"/>
+          </p:nvPr>
+        </p:nvPicPr>
+        <p:blipFill>
+          <a:blip r:embed="rId2">
+            <a:extLst>
+              <a:ext uri="{28A0092B-C50C-407E-A947-70E740481C1C}">
+                <a14:useLocalDpi xmlns:a14="http://schemas.microsoft.com/office/drawing/2010/main" val="0"/>
+              </a:ext>
+            </a:extLst>
+          </a:blip>
+          <a:stretch>
+            <a:fillRect/>
+          </a:stretch>
+        </p:blipFill>
+        <p:spPr>
+          <a:xfrm>
+            <a:off x="642938" y="708025"/>
+            <a:ext cx="3249613" cy="2684463"/>
+          </a:xfrm>
+        </p:spPr>
+      </p:pic>
+      <p:pic>
+        <p:nvPicPr>
+          <p:cNvPr id="8" name="Content Placeholder 7" descr="Chart, scatter chart&#10;&#10;Description automatically generated">
+            <a:extLst>
+              <a:ext uri="{FF2B5EF4-FFF2-40B4-BE49-F238E27FC236}">
+                <a16:creationId xmlns:a16="http://schemas.microsoft.com/office/drawing/2014/main" id="{D7F03AB8-B5AB-7E25-0135-95BC57156C82}"/>
+              </a:ext>
+            </a:extLst>
+          </p:cNvPr>
+          <p:cNvPicPr>
+            <a:picLocks noGrp="1" noChangeAspect="1"/>
+          </p:cNvPicPr>
+          <p:nvPr>
+            <p:ph sz="half" idx="2"/>
+          </p:nvPr>
+        </p:nvPicPr>
+        <p:blipFill>
+          <a:blip r:embed="rId3">
+            <a:extLst>
+              <a:ext uri="{28A0092B-C50C-407E-A947-70E740481C1C}">
+                <a14:useLocalDpi xmlns:a14="http://schemas.microsoft.com/office/drawing/2010/main" val="0"/>
+              </a:ext>
+            </a:extLst>
+          </a:blip>
+          <a:stretch>
+            <a:fillRect/>
+          </a:stretch>
+        </p:blipFill>
+        <p:spPr>
+          <a:xfrm>
+            <a:off x="642938" y="3459163"/>
+            <a:ext cx="3249613" cy="2684463"/>
+          </a:xfrm>
+        </p:spPr>
+      </p:pic>
+      <p:pic>
+        <p:nvPicPr>
+          <p:cNvPr id="12" name="Picture 11" descr="Chart, scatter chart&#10;&#10;Description automatically generated">
+            <a:extLst>
+              <a:ext uri="{FF2B5EF4-FFF2-40B4-BE49-F238E27FC236}">
+                <a16:creationId xmlns:a16="http://schemas.microsoft.com/office/drawing/2014/main" id="{CA28A018-0740-E579-8F3A-049EC34E5AE3}"/>
+              </a:ext>
+            </a:extLst>
+          </p:cNvPr>
+          <p:cNvPicPr>
+            <a:picLocks noChangeAspect="1"/>
+          </p:cNvPicPr>
+          <p:nvPr/>
+        </p:nvPicPr>
+        <p:blipFill>
+          <a:blip r:embed="rId4">
+            <a:extLst>
+              <a:ext uri="{28A0092B-C50C-407E-A947-70E740481C1C}">
+                <a14:useLocalDpi xmlns:a14="http://schemas.microsoft.com/office/drawing/2010/main" val="0"/>
+              </a:ext>
+            </a:extLst>
+          </a:blip>
+          <a:stretch>
+            <a:fillRect/>
+          </a:stretch>
+        </p:blipFill>
+        <p:spPr>
+          <a:xfrm>
+            <a:off x="3957638" y="708025"/>
+            <a:ext cx="3252788" cy="2684463"/>
+          </a:xfrm>
+          <a:prstGeom prst="rect">
+            <a:avLst/>
+          </a:prstGeom>
+        </p:spPr>
+      </p:pic>
+      <p:pic>
+        <p:nvPicPr>
+          <p:cNvPr id="10" name="Picture 9" descr="Chart, radar chart, scatter chart&#10;&#10;Description automatically generated">
+            <a:extLst>
+              <a:ext uri="{FF2B5EF4-FFF2-40B4-BE49-F238E27FC236}">
+                <a16:creationId xmlns:a16="http://schemas.microsoft.com/office/drawing/2014/main" id="{3A591A57-6883-40E5-2332-F7DF83EECC21}"/>
+              </a:ext>
+            </a:extLst>
+          </p:cNvPr>
+          <p:cNvPicPr>
+            <a:picLocks noChangeAspect="1"/>
+          </p:cNvPicPr>
+          <p:nvPr/>
+        </p:nvPicPr>
+        <p:blipFill>
+          <a:blip r:embed="rId5">
+            <a:extLst>
+              <a:ext uri="{28A0092B-C50C-407E-A947-70E740481C1C}">
+                <a14:useLocalDpi xmlns:a14="http://schemas.microsoft.com/office/drawing/2010/main" val="0"/>
+              </a:ext>
+            </a:extLst>
+          </a:blip>
+          <a:stretch>
+            <a:fillRect/>
+          </a:stretch>
+        </p:blipFill>
+        <p:spPr>
+          <a:xfrm>
+            <a:off x="3957638" y="3459163"/>
+            <a:ext cx="3252788" cy="2684463"/>
+          </a:xfrm>
+          <a:prstGeom prst="rect">
+            <a:avLst/>
+          </a:prstGeom>
+        </p:spPr>
+      </p:pic>
+      <p:sp>
+        <p:nvSpPr>
+          <p:cNvPr id="4" name="Title 3">
+            <a:extLst>
+              <a:ext uri="{FF2B5EF4-FFF2-40B4-BE49-F238E27FC236}">
+                <a16:creationId xmlns:a16="http://schemas.microsoft.com/office/drawing/2014/main" id="{FDA6A128-D30D-4F0B-A064-09B6DC7A7F1B}"/>
               </a:ext>
             </a:extLst>
           </p:cNvPr>
@@ -5603,17 +5766,27 @@
         </p:nvSpPr>
         <p:spPr>
           <a:xfrm>
-            <a:off x="1781174" y="355078"/>
-            <a:ext cx="9348789" cy="1173471"/>
-          </a:xfrm>
-        </p:spPr>
-        <p:txBody>
-          <a:bodyPr/>
+            <a:off x="8153399" y="640081"/>
+            <a:ext cx="3395133" cy="5574452"/>
+          </a:xfrm>
+        </p:spPr>
+        <p:txBody>
+          <a:bodyPr vert="horz" lIns="91440" tIns="45720" rIns="91440" bIns="45720" rtlCol="0" anchor="ctr">
+            <a:normAutofit/>
+          </a:bodyPr>
           <a:lstStyle/>
           <a:p>
-            <a:r>
-              <a:rPr lang="en-US" dirty="0"/>
-              <a:t>TUMERIC BIODIESEL ENNUI </a:t>
+            <a:pPr algn="l"/>
+            <a:r>
+              <a:rPr lang="en-US" kern="1200">
+                <a:solidFill>
+                  <a:srgbClr val="FFFFFF"/>
+                </a:solidFill>
+                <a:latin typeface="+mj-lt"/>
+                <a:ea typeface="+mj-ea"/>
+                <a:cs typeface="+mj-cs"/>
+              </a:rPr>
+              <a:t>4 Area System</a:t>
             </a:r>
           </a:p>
         </p:txBody>
@@ -5621,7 +5794,7 @@
     </p:spTree>
     <p:extLst>
       <p:ext uri="{BB962C8B-B14F-4D97-AF65-F5344CB8AC3E}">
-        <p14:creationId xmlns:p14="http://schemas.microsoft.com/office/powerpoint/2010/main" val="558608459"/>
+        <p14:creationId xmlns:p14="http://schemas.microsoft.com/office/powerpoint/2010/main" val="1735641184"/>
       </p:ext>
     </p:extLst>
   </p:cSld>
@@ -5634,6 +5807,14 @@
 <file path=ppt/slides/slide8.xml><?xml version="1.0" encoding="utf-8"?>
 <p:sld xmlns:a="http://schemas.openxmlformats.org/drawingml/2006/main" xmlns:r="http://schemas.openxmlformats.org/officeDocument/2006/relationships" xmlns:p="http://schemas.openxmlformats.org/presentationml/2006/main">
   <p:cSld>
+    <p:bg>
+      <p:bgPr>
+        <a:solidFill>
+          <a:schemeClr val="bg1"/>
+        </a:solidFill>
+        <a:effectLst/>
+      </p:bgPr>
+    </p:bg>
     <p:spTree>
       <p:nvGrpSpPr>
         <p:cNvPr id="1" name=""/>
@@ -5648,10 +5829,367 @@
           <a:chExt cx="0" cy="0"/>
         </a:xfrm>
       </p:grpSpPr>
+      <p:sp>
+        <p:nvSpPr>
+          <p:cNvPr id="26" name="Rectangle 25">
+            <a:extLst>
+              <a:ext uri="{FF2B5EF4-FFF2-40B4-BE49-F238E27FC236}">
+                <a16:creationId xmlns:a16="http://schemas.microsoft.com/office/drawing/2014/main" id="{6753252F-4873-4F63-801D-CC719279A7D5}"/>
+              </a:ext>
+              <a:ext uri="{C183D7F6-B498-43B3-948B-1728B52AA6E4}">
+                <adec:decorative xmlns:adec="http://schemas.microsoft.com/office/drawing/2017/decorative" val="1"/>
+              </a:ext>
+            </a:extLst>
+          </p:cNvPr>
+          <p:cNvSpPr>
+            <a:spLocks noGrp="1" noRot="1" noChangeAspect="1" noMove="1" noResize="1" noEditPoints="1" noAdjustHandles="1" noChangeArrowheads="1" noChangeShapeType="1" noTextEdit="1"/>
+          </p:cNvSpPr>
+          <p:nvPr>
+            <p:extLst>
+              <p:ext uri="{386F3935-93C4-4BCD-93E2-E3B085C9AB24}">
+                <p16:designElem xmlns:p16="http://schemas.microsoft.com/office/powerpoint/2015/main" val="1"/>
+              </p:ext>
+            </p:extLst>
+          </p:nvPr>
+        </p:nvSpPr>
+        <p:spPr>
+          <a:xfrm>
+            <a:off x="0" y="0"/>
+            <a:ext cx="12192000" cy="6858000"/>
+          </a:xfrm>
+          <a:prstGeom prst="rect">
+            <a:avLst/>
+          </a:prstGeom>
+          <a:solidFill>
+            <a:srgbClr val="FFFFFF"/>
+          </a:solidFill>
+          <a:ln>
+            <a:noFill/>
+          </a:ln>
+        </p:spPr>
+        <p:style>
+          <a:lnRef idx="2">
+            <a:schemeClr val="accent1">
+              <a:shade val="50000"/>
+            </a:schemeClr>
+          </a:lnRef>
+          <a:fillRef idx="1">
+            <a:schemeClr val="accent1"/>
+          </a:fillRef>
+          <a:effectRef idx="0">
+            <a:schemeClr val="accent1"/>
+          </a:effectRef>
+          <a:fontRef idx="minor">
+            <a:schemeClr val="lt1"/>
+          </a:fontRef>
+        </p:style>
+        <p:txBody>
+          <a:bodyPr rtlCol="0" anchor="ctr"/>
+          <a:lstStyle/>
+          <a:p>
+            <a:pPr algn="ctr"/>
+            <a:endParaRPr lang="en-US"/>
+          </a:p>
+        </p:txBody>
+      </p:sp>
+      <p:sp>
+        <p:nvSpPr>
+          <p:cNvPr id="28" name="Rectangle 27">
+            <a:extLst>
+              <a:ext uri="{FF2B5EF4-FFF2-40B4-BE49-F238E27FC236}">
+                <a16:creationId xmlns:a16="http://schemas.microsoft.com/office/drawing/2014/main" id="{047C8CCB-F95D-4249-92DD-651249D3535A}"/>
+              </a:ext>
+              <a:ext uri="{C183D7F6-B498-43B3-948B-1728B52AA6E4}">
+                <adec:decorative xmlns:adec="http://schemas.microsoft.com/office/drawing/2017/decorative" val="1"/>
+              </a:ext>
+            </a:extLst>
+          </p:cNvPr>
+          <p:cNvSpPr>
+            <a:spLocks noGrp="1" noRot="1" noChangeAspect="1" noMove="1" noResize="1" noEditPoints="1" noAdjustHandles="1" noChangeArrowheads="1" noChangeShapeType="1" noTextEdit="1"/>
+          </p:cNvSpPr>
+          <p:nvPr>
+            <p:extLst>
+              <p:ext uri="{386F3935-93C4-4BCD-93E2-E3B085C9AB24}">
+                <p16:designElem xmlns:p16="http://schemas.microsoft.com/office/powerpoint/2015/main" val="1"/>
+              </p:ext>
+            </p:extLst>
+          </p:nvPr>
+        </p:nvSpPr>
+        <p:spPr>
+          <a:xfrm>
+            <a:off x="0" y="0"/>
+            <a:ext cx="2013557" cy="6858000"/>
+          </a:xfrm>
+          <a:prstGeom prst="rect">
+            <a:avLst/>
+          </a:prstGeom>
+          <a:solidFill>
+            <a:srgbClr val="7F7F7F"/>
+          </a:solidFill>
+          <a:ln>
+            <a:noFill/>
+          </a:ln>
+        </p:spPr>
+        <p:style>
+          <a:lnRef idx="2">
+            <a:schemeClr val="accent1">
+              <a:shade val="50000"/>
+            </a:schemeClr>
+          </a:lnRef>
+          <a:fillRef idx="1">
+            <a:schemeClr val="accent1"/>
+          </a:fillRef>
+          <a:effectRef idx="0">
+            <a:schemeClr val="accent1"/>
+          </a:effectRef>
+          <a:fontRef idx="minor">
+            <a:schemeClr val="lt1"/>
+          </a:fontRef>
+        </p:style>
+        <p:txBody>
+          <a:bodyPr rtlCol="0" anchor="ctr"/>
+          <a:lstStyle/>
+          <a:p>
+            <a:pPr algn="ctr"/>
+            <a:endParaRPr lang="en-US"/>
+          </a:p>
+        </p:txBody>
+      </p:sp>
+      <p:pic>
+        <p:nvPicPr>
+          <p:cNvPr id="11" name="Content Placeholder 10" descr="Chart, scatter chart&#10;&#10;Description automatically generated">
+            <a:extLst>
+              <a:ext uri="{FF2B5EF4-FFF2-40B4-BE49-F238E27FC236}">
+                <a16:creationId xmlns:a16="http://schemas.microsoft.com/office/drawing/2014/main" id="{0CB8FEFA-9278-8F01-BD9B-55C7315281C5}"/>
+              </a:ext>
+            </a:extLst>
+          </p:cNvPr>
+          <p:cNvPicPr>
+            <a:picLocks noGrp="1" noChangeAspect="1"/>
+          </p:cNvPicPr>
+          <p:nvPr>
+            <p:ph sz="half" idx="1"/>
+          </p:nvPr>
+        </p:nvPicPr>
+        <p:blipFill>
+          <a:blip r:embed="rId2">
+            <a:extLst>
+              <a:ext uri="{28A0092B-C50C-407E-A947-70E740481C1C}">
+                <a14:useLocalDpi xmlns:a14="http://schemas.microsoft.com/office/drawing/2010/main" val="0"/>
+              </a:ext>
+            </a:extLst>
+          </a:blip>
+          <a:stretch>
+            <a:fillRect/>
+          </a:stretch>
+        </p:blipFill>
+        <p:spPr>
+          <a:xfrm>
+            <a:off x="4049713" y="960438"/>
+            <a:ext cx="2347913" cy="1936750"/>
+          </a:xfrm>
+        </p:spPr>
+      </p:pic>
+      <p:pic>
+        <p:nvPicPr>
+          <p:cNvPr id="16" name="Picture 15" descr="Chart, line chart&#10;&#10;Description automatically generated">
+            <a:extLst>
+              <a:ext uri="{FF2B5EF4-FFF2-40B4-BE49-F238E27FC236}">
+                <a16:creationId xmlns:a16="http://schemas.microsoft.com/office/drawing/2014/main" id="{5BAA0662-B3E6-7AF9-595E-AFE2C89E0564}"/>
+              </a:ext>
+            </a:extLst>
+          </p:cNvPr>
+          <p:cNvPicPr>
+            <a:picLocks noChangeAspect="1"/>
+          </p:cNvPicPr>
+          <p:nvPr/>
+        </p:nvPicPr>
+        <p:blipFill>
+          <a:blip r:embed="rId3">
+            <a:extLst>
+              <a:ext uri="{28A0092B-C50C-407E-A947-70E740481C1C}">
+                <a14:useLocalDpi xmlns:a14="http://schemas.microsoft.com/office/drawing/2010/main" val="0"/>
+              </a:ext>
+            </a:extLst>
+          </a:blip>
+          <a:stretch>
+            <a:fillRect/>
+          </a:stretch>
+        </p:blipFill>
+        <p:spPr>
+          <a:xfrm>
+            <a:off x="6456363" y="960438"/>
+            <a:ext cx="2347913" cy="1936750"/>
+          </a:xfrm>
+          <a:prstGeom prst="rect">
+            <a:avLst/>
+          </a:prstGeom>
+        </p:spPr>
+      </p:pic>
+      <p:pic>
+        <p:nvPicPr>
+          <p:cNvPr id="19" name="Picture 18" descr="Chart, scatter chart&#10;&#10;Description automatically generated">
+            <a:extLst>
+              <a:ext uri="{FF2B5EF4-FFF2-40B4-BE49-F238E27FC236}">
+                <a16:creationId xmlns:a16="http://schemas.microsoft.com/office/drawing/2014/main" id="{0AF9515C-89B4-8562-6795-BAD1591BF59A}"/>
+              </a:ext>
+            </a:extLst>
+          </p:cNvPr>
+          <p:cNvPicPr>
+            <a:picLocks noChangeAspect="1"/>
+          </p:cNvPicPr>
+          <p:nvPr/>
+        </p:nvPicPr>
+        <p:blipFill>
+          <a:blip r:embed="rId4">
+            <a:extLst>
+              <a:ext uri="{28A0092B-C50C-407E-A947-70E740481C1C}">
+                <a14:useLocalDpi xmlns:a14="http://schemas.microsoft.com/office/drawing/2010/main" val="0"/>
+              </a:ext>
+            </a:extLst>
+          </a:blip>
+          <a:stretch>
+            <a:fillRect/>
+          </a:stretch>
+        </p:blipFill>
+        <p:spPr>
+          <a:xfrm>
+            <a:off x="8866188" y="960438"/>
+            <a:ext cx="2347913" cy="1936750"/>
+          </a:xfrm>
+          <a:prstGeom prst="rect">
+            <a:avLst/>
+          </a:prstGeom>
+        </p:spPr>
+      </p:pic>
+      <p:pic>
+        <p:nvPicPr>
+          <p:cNvPr id="21" name="Picture 20" descr="Chart, line chart&#10;&#10;Description automatically generated">
+            <a:extLst>
+              <a:ext uri="{FF2B5EF4-FFF2-40B4-BE49-F238E27FC236}">
+                <a16:creationId xmlns:a16="http://schemas.microsoft.com/office/drawing/2014/main" id="{92624B91-49B6-B6C4-DF32-62D4EAB12078}"/>
+              </a:ext>
+            </a:extLst>
+          </p:cNvPr>
+          <p:cNvPicPr>
+            <a:picLocks noChangeAspect="1"/>
+          </p:cNvPicPr>
+          <p:nvPr/>
+        </p:nvPicPr>
+        <p:blipFill>
+          <a:blip r:embed="rId5">
+            <a:extLst>
+              <a:ext uri="{28A0092B-C50C-407E-A947-70E740481C1C}">
+                <a14:useLocalDpi xmlns:a14="http://schemas.microsoft.com/office/drawing/2010/main" val="0"/>
+              </a:ext>
+            </a:extLst>
+          </a:blip>
+          <a:stretch>
+            <a:fillRect/>
+          </a:stretch>
+        </p:blipFill>
+        <p:spPr>
+          <a:xfrm>
+            <a:off x="4049713" y="2955925"/>
+            <a:ext cx="3551238" cy="2933700"/>
+          </a:xfrm>
+          <a:prstGeom prst="rect">
+            <a:avLst/>
+          </a:prstGeom>
+        </p:spPr>
+      </p:pic>
+      <p:pic>
+        <p:nvPicPr>
+          <p:cNvPr id="14" name="Content Placeholder 13" descr="Chart, scatter chart&#10;&#10;Description automatically generated">
+            <a:extLst>
+              <a:ext uri="{FF2B5EF4-FFF2-40B4-BE49-F238E27FC236}">
+                <a16:creationId xmlns:a16="http://schemas.microsoft.com/office/drawing/2014/main" id="{A845EE88-9793-24E0-C8E8-16C80A05723B}"/>
+              </a:ext>
+            </a:extLst>
+          </p:cNvPr>
+          <p:cNvPicPr>
+            <a:picLocks noGrp="1" noChangeAspect="1"/>
+          </p:cNvPicPr>
+          <p:nvPr>
+            <p:ph sz="half" idx="2"/>
+          </p:nvPr>
+        </p:nvPicPr>
+        <p:blipFill>
+          <a:blip r:embed="rId6">
+            <a:extLst>
+              <a:ext uri="{28A0092B-C50C-407E-A947-70E740481C1C}">
+                <a14:useLocalDpi xmlns:a14="http://schemas.microsoft.com/office/drawing/2010/main" val="0"/>
+              </a:ext>
+            </a:extLst>
+          </a:blip>
+          <a:stretch>
+            <a:fillRect/>
+          </a:stretch>
+        </p:blipFill>
+        <p:spPr>
+          <a:xfrm>
+            <a:off x="7661275" y="2955925"/>
+            <a:ext cx="3554413" cy="2933700"/>
+          </a:xfrm>
+        </p:spPr>
+      </p:pic>
+      <p:sp>
+        <p:nvSpPr>
+          <p:cNvPr id="4" name="Title 3">
+            <a:extLst>
+              <a:ext uri="{FF2B5EF4-FFF2-40B4-BE49-F238E27FC236}">
+                <a16:creationId xmlns:a16="http://schemas.microsoft.com/office/drawing/2014/main" id="{FDA6A128-D30D-4F0B-A064-09B6DC7A7F1B}"/>
+              </a:ext>
+            </a:extLst>
+          </p:cNvPr>
+          <p:cNvSpPr>
+            <a:spLocks noGrp="1"/>
+          </p:cNvSpPr>
+          <p:nvPr>
+            <p:ph type="title"/>
+          </p:nvPr>
+        </p:nvSpPr>
+        <p:spPr>
+          <a:xfrm>
+            <a:off x="640080" y="2074363"/>
+            <a:ext cx="2752354" cy="2709275"/>
+          </a:xfrm>
+          <a:prstGeom prst="ellipse">
+            <a:avLst/>
+          </a:prstGeom>
+          <a:solidFill>
+            <a:srgbClr val="262626"/>
+          </a:solidFill>
+          <a:ln w="174625" cmpd="thinThick">
+            <a:solidFill>
+              <a:srgbClr val="262626"/>
+            </a:solidFill>
+          </a:ln>
+        </p:spPr>
+        <p:txBody>
+          <a:bodyPr vert="horz" lIns="91440" tIns="45720" rIns="91440" bIns="45720" rtlCol="0" anchor="ctr">
+            <a:normAutofit/>
+          </a:bodyPr>
+          <a:lstStyle/>
+          <a:p>
+            <a:r>
+              <a:rPr lang="en-US" sz="2600" kern="1200">
+                <a:solidFill>
+                  <a:srgbClr val="FFFFFF"/>
+                </a:solidFill>
+                <a:latin typeface="+mj-lt"/>
+                <a:ea typeface="+mj-ea"/>
+                <a:cs typeface="+mj-cs"/>
+              </a:rPr>
+              <a:t>5 Area System</a:t>
+            </a:r>
+          </a:p>
+        </p:txBody>
+      </p:sp>
     </p:spTree>
     <p:extLst>
       <p:ext uri="{BB962C8B-B14F-4D97-AF65-F5344CB8AC3E}">
-        <p14:creationId xmlns:p14="http://schemas.microsoft.com/office/powerpoint/2010/main" val="1059548903"/>
+        <p14:creationId xmlns:p14="http://schemas.microsoft.com/office/powerpoint/2010/main" val="2998658186"/>
       </p:ext>
     </p:extLst>
   </p:cSld>
@@ -5664,6 +6202,14 @@
 <file path=ppt/slides/slide9.xml><?xml version="1.0" encoding="utf-8"?>
 <p:sld xmlns:a="http://schemas.openxmlformats.org/drawingml/2006/main" xmlns:r="http://schemas.openxmlformats.org/officeDocument/2006/relationships" xmlns:p="http://schemas.openxmlformats.org/presentationml/2006/main">
   <p:cSld>
+    <p:bg>
+      <p:bgPr>
+        <a:solidFill>
+          <a:schemeClr val="bg1"/>
+        </a:solidFill>
+        <a:effectLst/>
+      </p:bgPr>
+    </p:bg>
     <p:spTree>
       <p:nvGrpSpPr>
         <p:cNvPr id="1" name=""/>
@@ -5680,10 +6226,244 @@
       </p:grpSpPr>
       <p:sp>
         <p:nvSpPr>
-          <p:cNvPr id="3" name="Title 2">
-            <a:extLst>
-              <a:ext uri="{FF2B5EF4-FFF2-40B4-BE49-F238E27FC236}">
-                <a16:creationId xmlns:a16="http://schemas.microsoft.com/office/drawing/2014/main" id="{3CBE6577-E72F-4D95-91CF-D5BE94921AED}"/>
+          <p:cNvPr id="33" name="Rectangle 32">
+            <a:extLst>
+              <a:ext uri="{FF2B5EF4-FFF2-40B4-BE49-F238E27FC236}">
+                <a16:creationId xmlns:a16="http://schemas.microsoft.com/office/drawing/2014/main" id="{ECEF6C2F-9906-4F89-9B4F-598E9F344B03}"/>
+              </a:ext>
+              <a:ext uri="{C183D7F6-B498-43B3-948B-1728B52AA6E4}">
+                <adec:decorative xmlns:adec="http://schemas.microsoft.com/office/drawing/2017/decorative" val="1"/>
+              </a:ext>
+            </a:extLst>
+          </p:cNvPr>
+          <p:cNvSpPr>
+            <a:spLocks noGrp="1" noRot="1" noChangeAspect="1" noMove="1" noResize="1" noEditPoints="1" noAdjustHandles="1" noChangeArrowheads="1" noChangeShapeType="1" noTextEdit="1"/>
+          </p:cNvSpPr>
+          <p:nvPr>
+            <p:extLst>
+              <p:ext uri="{386F3935-93C4-4BCD-93E2-E3B085C9AB24}">
+                <p16:designElem xmlns:p16="http://schemas.microsoft.com/office/powerpoint/2015/main" val="1"/>
+              </p:ext>
+            </p:extLst>
+          </p:nvPr>
+        </p:nvSpPr>
+        <p:spPr>
+          <a:xfrm>
+            <a:off x="0" y="0"/>
+            <a:ext cx="12192000" cy="4242816"/>
+          </a:xfrm>
+          <a:prstGeom prst="rect">
+            <a:avLst/>
+          </a:prstGeom>
+          <a:solidFill>
+            <a:srgbClr val="FFFFFF"/>
+          </a:solidFill>
+          <a:ln>
+            <a:noFill/>
+          </a:ln>
+        </p:spPr>
+        <p:style>
+          <a:lnRef idx="2">
+            <a:schemeClr val="accent1">
+              <a:shade val="50000"/>
+            </a:schemeClr>
+          </a:lnRef>
+          <a:fillRef idx="1">
+            <a:schemeClr val="accent1"/>
+          </a:fillRef>
+          <a:effectRef idx="0">
+            <a:schemeClr val="accent1"/>
+          </a:effectRef>
+          <a:fontRef idx="minor">
+            <a:schemeClr val="lt1"/>
+          </a:fontRef>
+        </p:style>
+        <p:txBody>
+          <a:bodyPr rtlCol="0" anchor="ctr"/>
+          <a:lstStyle/>
+          <a:p>
+            <a:pPr algn="ctr"/>
+            <a:endParaRPr lang="en-US"/>
+          </a:p>
+        </p:txBody>
+      </p:sp>
+      <p:sp>
+        <p:nvSpPr>
+          <p:cNvPr id="35" name="Rectangle 34">
+            <a:extLst>
+              <a:ext uri="{FF2B5EF4-FFF2-40B4-BE49-F238E27FC236}">
+                <a16:creationId xmlns:a16="http://schemas.microsoft.com/office/drawing/2014/main" id="{91E12CD6-A76F-439F-9C98-C0211D8FD814}"/>
+              </a:ext>
+              <a:ext uri="{C183D7F6-B498-43B3-948B-1728B52AA6E4}">
+                <adec:decorative xmlns:adec="http://schemas.microsoft.com/office/drawing/2017/decorative" val="1"/>
+              </a:ext>
+            </a:extLst>
+          </p:cNvPr>
+          <p:cNvSpPr>
+            <a:spLocks noGrp="1" noRot="1" noChangeAspect="1" noMove="1" noResize="1" noEditPoints="1" noAdjustHandles="1" noChangeArrowheads="1" noChangeShapeType="1" noTextEdit="1"/>
+          </p:cNvSpPr>
+          <p:nvPr>
+            <p:extLst>
+              <p:ext uri="{386F3935-93C4-4BCD-93E2-E3B085C9AB24}">
+                <p16:designElem xmlns:p16="http://schemas.microsoft.com/office/powerpoint/2015/main" val="1"/>
+              </p:ext>
+            </p:extLst>
+          </p:nvPr>
+        </p:nvSpPr>
+        <p:spPr>
+          <a:xfrm>
+            <a:off x="0" y="4242816"/>
+            <a:ext cx="12192000" cy="2615184"/>
+          </a:xfrm>
+          <a:prstGeom prst="rect">
+            <a:avLst/>
+          </a:prstGeom>
+          <a:solidFill>
+            <a:schemeClr val="bg1">
+              <a:lumMod val="85000"/>
+            </a:schemeClr>
+          </a:solidFill>
+          <a:ln>
+            <a:noFill/>
+          </a:ln>
+        </p:spPr>
+        <p:style>
+          <a:lnRef idx="2">
+            <a:schemeClr val="accent1">
+              <a:shade val="50000"/>
+            </a:schemeClr>
+          </a:lnRef>
+          <a:fillRef idx="1">
+            <a:schemeClr val="accent1"/>
+          </a:fillRef>
+          <a:effectRef idx="0">
+            <a:schemeClr val="accent1"/>
+          </a:effectRef>
+          <a:fontRef idx="minor">
+            <a:schemeClr val="lt1"/>
+          </a:fontRef>
+        </p:style>
+        <p:txBody>
+          <a:bodyPr rtlCol="0" anchor="ctr"/>
+          <a:lstStyle/>
+          <a:p>
+            <a:pPr algn="ctr"/>
+            <a:endParaRPr lang="en-US"/>
+          </a:p>
+        </p:txBody>
+      </p:sp>
+      <p:pic>
+        <p:nvPicPr>
+          <p:cNvPr id="8" name="Content Placeholder 7" descr="Chart, scatter chart&#10;&#10;Description automatically generated">
+            <a:extLst>
+              <a:ext uri="{FF2B5EF4-FFF2-40B4-BE49-F238E27FC236}">
+                <a16:creationId xmlns:a16="http://schemas.microsoft.com/office/drawing/2014/main" id="{504B4C42-9ED5-BC76-1279-D7589A7DF249}"/>
+              </a:ext>
+            </a:extLst>
+          </p:cNvPr>
+          <p:cNvPicPr>
+            <a:picLocks noGrp="1" noChangeAspect="1"/>
+          </p:cNvPicPr>
+          <p:nvPr>
+            <p:ph sz="half" idx="1"/>
+          </p:nvPr>
+        </p:nvPicPr>
+        <p:blipFill>
+          <a:blip r:embed="rId2">
+            <a:extLst>
+              <a:ext uri="{28A0092B-C50C-407E-A947-70E740481C1C}">
+                <a14:useLocalDpi xmlns:a14="http://schemas.microsoft.com/office/drawing/2010/main" val="0"/>
+              </a:ext>
+            </a:extLst>
+          </a:blip>
+          <a:stretch>
+            <a:fillRect/>
+          </a:stretch>
+        </p:blipFill>
+        <p:spPr>
+          <a:xfrm>
+            <a:off x="649288" y="801688"/>
+            <a:ext cx="3584575" cy="2957513"/>
+          </a:xfrm>
+        </p:spPr>
+      </p:pic>
+      <p:pic>
+        <p:nvPicPr>
+          <p:cNvPr id="13" name="Picture 12" descr="Chart, radar chart, scatter chart&#10;&#10;Description automatically generated">
+            <a:extLst>
+              <a:ext uri="{FF2B5EF4-FFF2-40B4-BE49-F238E27FC236}">
+                <a16:creationId xmlns:a16="http://schemas.microsoft.com/office/drawing/2014/main" id="{8A7E1BA6-74E2-2BCE-3D38-ADEB41FC17CD}"/>
+              </a:ext>
+            </a:extLst>
+          </p:cNvPr>
+          <p:cNvPicPr>
+            <a:picLocks noChangeAspect="1"/>
+          </p:cNvPicPr>
+          <p:nvPr/>
+        </p:nvPicPr>
+        <p:blipFill>
+          <a:blip r:embed="rId3">
+            <a:extLst>
+              <a:ext uri="{28A0092B-C50C-407E-A947-70E740481C1C}">
+                <a14:useLocalDpi xmlns:a14="http://schemas.microsoft.com/office/drawing/2010/main" val="0"/>
+              </a:ext>
+            </a:extLst>
+          </a:blip>
+          <a:stretch>
+            <a:fillRect/>
+          </a:stretch>
+        </p:blipFill>
+        <p:spPr>
+          <a:xfrm>
+            <a:off x="4308475" y="801688"/>
+            <a:ext cx="3584575" cy="2957513"/>
+          </a:xfrm>
+          <a:prstGeom prst="rect">
+            <a:avLst/>
+          </a:prstGeom>
+        </p:spPr>
+      </p:pic>
+      <p:pic>
+        <p:nvPicPr>
+          <p:cNvPr id="10" name="Content Placeholder 9" descr="Chart, scatter chart&#10;&#10;Description automatically generated">
+            <a:extLst>
+              <a:ext uri="{FF2B5EF4-FFF2-40B4-BE49-F238E27FC236}">
+                <a16:creationId xmlns:a16="http://schemas.microsoft.com/office/drawing/2014/main" id="{452B3CB8-3DEB-7528-7B45-66F89ADC57C6}"/>
+              </a:ext>
+            </a:extLst>
+          </p:cNvPr>
+          <p:cNvPicPr>
+            <a:picLocks noGrp="1" noChangeAspect="1"/>
+          </p:cNvPicPr>
+          <p:nvPr>
+            <p:ph sz="half" idx="2"/>
+          </p:nvPr>
+        </p:nvPicPr>
+        <p:blipFill>
+          <a:blip r:embed="rId4">
+            <a:extLst>
+              <a:ext uri="{28A0092B-C50C-407E-A947-70E740481C1C}">
+                <a14:useLocalDpi xmlns:a14="http://schemas.microsoft.com/office/drawing/2010/main" val="0"/>
+              </a:ext>
+            </a:extLst>
+          </a:blip>
+          <a:stretch>
+            <a:fillRect/>
+          </a:stretch>
+        </p:blipFill>
+        <p:spPr>
+          <a:xfrm>
+            <a:off x="7967663" y="801688"/>
+            <a:ext cx="3584575" cy="2957513"/>
+          </a:xfrm>
+        </p:spPr>
+      </p:pic>
+      <p:sp>
+        <p:nvSpPr>
+          <p:cNvPr id="4" name="Title 3">
+            <a:extLst>
+              <a:ext uri="{FF2B5EF4-FFF2-40B4-BE49-F238E27FC236}">
+                <a16:creationId xmlns:a16="http://schemas.microsoft.com/office/drawing/2014/main" id="{FDA6A128-D30D-4F0B-A064-09B6DC7A7F1B}"/>
               </a:ext>
             </a:extLst>
           </p:cNvPr>
@@ -5696,65 +6476,29 @@
         </p:nvSpPr>
         <p:spPr>
           <a:xfrm>
-            <a:off x="1781174" y="818540"/>
-            <a:ext cx="7171757" cy="1272756"/>
-          </a:xfrm>
-        </p:spPr>
-        <p:txBody>
-          <a:bodyPr/>
+            <a:off x="838200" y="4636802"/>
+            <a:ext cx="10515600" cy="1325563"/>
+          </a:xfrm>
+          <a:prstGeom prst="ellipse">
+            <a:avLst/>
+          </a:prstGeom>
+        </p:spPr>
+        <p:txBody>
+          <a:bodyPr vert="horz" lIns="91440" tIns="45720" rIns="91440" bIns="45720" rtlCol="0" anchor="ctr">
+            <a:normAutofit/>
+          </a:bodyPr>
           <a:lstStyle/>
           <a:p>
             <a:r>
-              <a:rPr lang="en-US" dirty="0"/>
-              <a:t>LOCA VORE CARDIGAN </a:t>
-            </a:r>
-            <a:br>
-              <a:rPr lang="en-US" dirty="0"/>
-            </a:br>
-            <a:r>
-              <a:rPr lang="en-US" dirty="0"/>
-              <a:t>JEAN SHORTS </a:t>
-            </a:r>
-          </a:p>
-        </p:txBody>
-      </p:sp>
-      <p:sp>
-        <p:nvSpPr>
-          <p:cNvPr id="4" name="Text Placeholder 3">
-            <a:extLst>
-              <a:ext uri="{FF2B5EF4-FFF2-40B4-BE49-F238E27FC236}">
-                <a16:creationId xmlns:a16="http://schemas.microsoft.com/office/drawing/2014/main" id="{7721AD91-1D4A-408D-8089-161600AECD90}"/>
-              </a:ext>
-            </a:extLst>
-          </p:cNvPr>
-          <p:cNvSpPr>
-            <a:spLocks noGrp="1"/>
-          </p:cNvSpPr>
-          <p:nvPr>
-            <p:ph type="body" sz="quarter" idx="13"/>
-          </p:nvPr>
-        </p:nvSpPr>
-        <p:spPr>
-          <a:xfrm>
-            <a:off x="1781174" y="3018774"/>
-            <a:ext cx="4872973" cy="3118414"/>
-          </a:xfrm>
-        </p:spPr>
-        <p:txBody>
-          <a:bodyPr/>
-          <a:lstStyle/>
-          <a:p>
-            <a:r>
-              <a:rPr lang="en-US" dirty="0"/>
-              <a:t>Banh mi polaroid church-key skateboard gastropub, hell of you probably haven't heard of them cardigan tofu hoodie. Health goth literally chartreuse, fixie hashtag hexagon humblebrag heirloom fashion axe </a:t>
-            </a:r>
-            <a:r>
-              <a:rPr lang="en-US" dirty="0" err="1"/>
-              <a:t>chicharrones</a:t>
-            </a:r>
-            <a:r>
-              <a:rPr lang="en-US" dirty="0"/>
-              <a:t>.</a:t>
+              <a:rPr lang="en-US" kern="1200">
+                <a:solidFill>
+                  <a:schemeClr val="tx1"/>
+                </a:solidFill>
+                <a:latin typeface="+mj-lt"/>
+                <a:ea typeface="+mj-ea"/>
+                <a:cs typeface="+mj-cs"/>
+              </a:rPr>
+              <a:t>3 Area System</a:t>
             </a:r>
           </a:p>
         </p:txBody>
@@ -5762,7 +6506,7 @@
     </p:spTree>
     <p:extLst>
       <p:ext uri="{BB962C8B-B14F-4D97-AF65-F5344CB8AC3E}">
-        <p14:creationId xmlns:p14="http://schemas.microsoft.com/office/powerpoint/2010/main" val="3208359678"/>
+        <p14:creationId xmlns:p14="http://schemas.microsoft.com/office/powerpoint/2010/main" val="3638011015"/>
       </p:ext>
     </p:extLst>
   </p:cSld>

</xml_diff>

<commit_message>
added Centralized OPF results
</commit_message>
<xml_diff>
--- a/research_showcase/researchSummary_aryan_ritwajeet_jha.pptx
+++ b/research_showcase/researchSummary_aryan_ritwajeet_jha.pptx
@@ -259,7 +259,7 @@
           <a:p>
             <a:fld id="{D542D976-EE9F-4D81-93B4-309048736BC3}" type="datetimeFigureOut">
               <a:rPr lang="en-US" smtClean="0"/>
-              <a:t>3/15/2023</a:t>
+              <a:t>3/29/2023</a:t>
             </a:fld>
             <a:endParaRPr lang="en-US"/>
           </a:p>
@@ -436,7 +436,7 @@
           <a:p>
             <a:fld id="{10CB9D09-B8C5-4B94-B5DC-AF4ED464E025}" type="datetimeFigureOut">
               <a:rPr lang="en-US" smtClean="0"/>
-              <a:t>3/15/2023</a:t>
+              <a:t>3/29/2023</a:t>
             </a:fld>
             <a:endParaRPr lang="en-US"/>
           </a:p>
@@ -4406,36 +4406,6 @@
       </p:grpSpPr>
       <p:sp>
         <p:nvSpPr>
-          <p:cNvPr id="2" name="Text Placeholder 1">
-            <a:extLst>
-              <a:ext uri="{FF2B5EF4-FFF2-40B4-BE49-F238E27FC236}">
-                <a16:creationId xmlns:a16="http://schemas.microsoft.com/office/drawing/2014/main" id="{09DF75FC-4792-41CB-958E-7EED40C8FDA9}"/>
-              </a:ext>
-            </a:extLst>
-          </p:cNvPr>
-          <p:cNvSpPr>
-            <a:spLocks noGrp="1"/>
-          </p:cNvSpPr>
-          <p:nvPr>
-            <p:ph type="body" idx="1"/>
-          </p:nvPr>
-        </p:nvSpPr>
-        <p:spPr>
-          <a:xfrm>
-            <a:off x="1781175" y="1923911"/>
-            <a:ext cx="4537075" cy="806904"/>
-          </a:xfrm>
-        </p:spPr>
-        <p:txBody>
-          <a:bodyPr/>
-          <a:lstStyle/>
-          <a:p>
-            <a:endParaRPr lang="en-US" dirty="0"/>
-          </a:p>
-        </p:txBody>
-      </p:sp>
-      <p:sp>
-        <p:nvSpPr>
           <p:cNvPr id="5" name="Content Placeholder 4">
             <a:extLst>
               <a:ext uri="{FF2B5EF4-FFF2-40B4-BE49-F238E27FC236}">
@@ -4452,9 +4422,38 @@
         </p:nvSpPr>
         <p:spPr>
           <a:xfrm>
-            <a:off x="1781175" y="2944164"/>
-            <a:ext cx="4537075" cy="3649357"/>
-          </a:xfrm>
+            <a:off x="1646263" y="1969804"/>
+            <a:ext cx="4537075" cy="811627"/>
+          </a:xfrm>
+          <a:gradFill>
+            <a:gsLst>
+              <a:gs pos="0">
+                <a:schemeClr val="accent1">
+                  <a:lumMod val="5000"/>
+                  <a:lumOff val="95000"/>
+                </a:schemeClr>
+              </a:gs>
+              <a:gs pos="74000">
+                <a:schemeClr val="accent1">
+                  <a:lumMod val="45000"/>
+                  <a:lumOff val="55000"/>
+                </a:schemeClr>
+              </a:gs>
+              <a:gs pos="83000">
+                <a:schemeClr val="accent1">
+                  <a:lumMod val="45000"/>
+                  <a:lumOff val="55000"/>
+                </a:schemeClr>
+              </a:gs>
+              <a:gs pos="100000">
+                <a:schemeClr val="accent1">
+                  <a:lumMod val="30000"/>
+                  <a:lumOff val="70000"/>
+                </a:schemeClr>
+              </a:gs>
+            </a:gsLst>
+            <a:lin ang="5400000" scaled="1"/>
+          </a:gradFill>
         </p:spPr>
         <p:txBody>
           <a:bodyPr/>
@@ -4485,9 +4484,39 @@
         </p:nvSpPr>
         <p:spPr>
           <a:xfrm>
-            <a:off x="6815138" y="2945001"/>
-            <a:ext cx="4535424" cy="3681539"/>
-          </a:xfrm>
+            <a:off x="6860109" y="2045592"/>
+            <a:ext cx="4535424" cy="4707477"/>
+          </a:xfrm>
+          <a:gradFill flip="none" rotWithShape="1">
+            <a:gsLst>
+              <a:gs pos="0">
+                <a:schemeClr val="accent5">
+                  <a:lumMod val="5000"/>
+                  <a:lumOff val="95000"/>
+                </a:schemeClr>
+              </a:gs>
+              <a:gs pos="74000">
+                <a:schemeClr val="accent5">
+                  <a:lumMod val="45000"/>
+                  <a:lumOff val="55000"/>
+                </a:schemeClr>
+              </a:gs>
+              <a:gs pos="83000">
+                <a:schemeClr val="accent5">
+                  <a:lumMod val="45000"/>
+                  <a:lumOff val="55000"/>
+                </a:schemeClr>
+              </a:gs>
+              <a:gs pos="100000">
+                <a:schemeClr val="accent5">
+                  <a:lumMod val="30000"/>
+                  <a:lumOff val="70000"/>
+                </a:schemeClr>
+              </a:gs>
+            </a:gsLst>
+            <a:lin ang="5400000" scaled="1"/>
+            <a:tileRect/>
+          </a:gradFill>
         </p:spPr>
         <p:txBody>
           <a:bodyPr/>
@@ -4495,7 +4524,31 @@
           <a:p>
             <a:r>
               <a:rPr lang="en-US" dirty="0"/>
-              <a:t>5 Area:</a:t>
+              <a:t>1 Area (Centralized OPF):</a:t>
+            </a:r>
+          </a:p>
+          <a:p>
+            <a:pPr lvl="1"/>
+            <a:r>
+              <a:rPr lang="en-US" dirty="0"/>
+              <a:t>Line Loss = 12.094kW</a:t>
+            </a:r>
+          </a:p>
+          <a:p>
+            <a:pPr lvl="1"/>
+            <a:r>
+              <a:rPr lang="en-US" dirty="0"/>
+              <a:t>Substation Power = 768.17kW</a:t>
+            </a:r>
+          </a:p>
+          <a:p>
+            <a:r>
+              <a:rPr lang="en-US"/>
+              <a:t>5 </a:t>
+            </a:r>
+            <a:r>
+              <a:rPr lang="en-US" dirty="0"/>
+              <a:t>Area:</a:t>
             </a:r>
           </a:p>
           <a:p>
@@ -4590,31 +4643,6 @@
               <a:rPr lang="en-US" dirty="0"/>
               <a:t>Some Test Runs over Different Area Divisions</a:t>
             </a:r>
-          </a:p>
-        </p:txBody>
-      </p:sp>
-      <p:sp>
-        <p:nvSpPr>
-          <p:cNvPr id="8" name="Text Placeholder 7">
-            <a:extLst>
-              <a:ext uri="{FF2B5EF4-FFF2-40B4-BE49-F238E27FC236}">
-                <a16:creationId xmlns:a16="http://schemas.microsoft.com/office/drawing/2014/main" id="{E42E8E3B-BCC5-DE93-A305-78F8B21C3CC0}"/>
-              </a:ext>
-            </a:extLst>
-          </p:cNvPr>
-          <p:cNvSpPr>
-            <a:spLocks noGrp="1"/>
-          </p:cNvSpPr>
-          <p:nvPr>
-            <p:ph type="body" sz="quarter" idx="3"/>
-          </p:nvPr>
-        </p:nvSpPr>
-        <p:spPr/>
-        <p:txBody>
-          <a:bodyPr/>
-          <a:lstStyle/>
-          <a:p>
-            <a:endParaRPr lang="en-IN" dirty="0"/>
           </a:p>
         </p:txBody>
       </p:sp>

</xml_diff>